<commit_message>
Revised Collated files and Portfolio
</commit_message>
<xml_diff>
--- a/docs/diagrams/GmapSequenceDiagram.pptx
+++ b/docs/diagrams/GmapSequenceDiagram.pptx
@@ -5,10 +5,12 @@
     <p:sldMasterId id="2147483648" r:id="rId1"/>
   </p:sldMasterIdLst>
   <p:notesMasterIdLst>
-    <p:notesMasterId r:id="rId3"/>
+    <p:notesMasterId r:id="rId5"/>
   </p:notesMasterIdLst>
   <p:sldIdLst>
-    <p:sldId id="267" r:id="rId2"/>
+    <p:sldId id="268" r:id="rId2"/>
+    <p:sldId id="269" r:id="rId3"/>
+    <p:sldId id="270" r:id="rId4"/>
   </p:sldIdLst>
   <p:sldSz cx="9144000" cy="6858000" type="screen4x3"/>
   <p:notesSz cx="6858000" cy="9144000"/>
@@ -126,6 +128,10 @@
 </p:presentation>
 </file>
 
+<file path=ppt/revisionInfo.xml><?xml version="1.0" encoding="utf-8"?>
+<p1510:revInfo xmlns:a="http://schemas.openxmlformats.org/drawingml/2006/main" xmlns:r="http://schemas.openxmlformats.org/officeDocument/2006/relationships" xmlns:p1510="http://schemas.microsoft.com/office/powerpoint/2015/10/main"/>
+</file>
+
 <file path=ppt/notesMasters/notesMaster1.xml><?xml version="1.0" encoding="utf-8"?>
 <p:notesMaster xmlns:a="http://schemas.openxmlformats.org/drawingml/2006/main" xmlns:r="http://schemas.openxmlformats.org/officeDocument/2006/relationships" xmlns:p="http://schemas.openxmlformats.org/presentationml/2006/main">
   <p:cSld>
@@ -208,7 +214,7 @@
           <a:p>
             <a:fld id="{F5CC4B3F-88C1-4FFA-B1B6-F41C21DC6924}" type="datetimeFigureOut">
               <a:rPr lang="en-US" smtClean="0"/>
-              <a:t>11/9/2017</a:t>
+              <a:t>11-Nov-17</a:t>
             </a:fld>
             <a:endParaRPr lang="en-US"/>
           </a:p>
@@ -272,38 +278,37 @@
           <a:p>
             <a:pPr lvl="0"/>
             <a:r>
-              <a:rPr lang="en-US" smtClean="0"/>
+              <a:rPr lang="en-US"/>
               <a:t>Click to edit Master text styles</a:t>
             </a:r>
           </a:p>
           <a:p>
             <a:pPr lvl="1"/>
             <a:r>
-              <a:rPr lang="en-US" smtClean="0"/>
+              <a:rPr lang="en-US"/>
               <a:t>Second level</a:t>
             </a:r>
           </a:p>
           <a:p>
             <a:pPr lvl="2"/>
             <a:r>
-              <a:rPr lang="en-US" smtClean="0"/>
+              <a:rPr lang="en-US"/>
               <a:t>Third level</a:t>
             </a:r>
           </a:p>
           <a:p>
             <a:pPr lvl="3"/>
             <a:r>
-              <a:rPr lang="en-US" smtClean="0"/>
+              <a:rPr lang="en-US"/>
               <a:t>Fourth level</a:t>
             </a:r>
           </a:p>
           <a:p>
             <a:pPr lvl="4"/>
             <a:r>
-              <a:rPr lang="en-US" smtClean="0"/>
+              <a:rPr lang="en-US"/>
               <a:t>Fifth level</a:t>
             </a:r>
-            <a:endParaRPr lang="en-US"/>
           </a:p>
         </p:txBody>
       </p:sp>
@@ -514,10 +519,9 @@
           <a:lstStyle/>
           <a:p>
             <a:r>
-              <a:rPr lang="en-US" smtClean="0"/>
+              <a:rPr lang="en-US"/>
               <a:t>Click to edit Master title style</a:t>
             </a:r>
-            <a:endParaRPr lang="en-US"/>
           </a:p>
         </p:txBody>
       </p:sp>
@@ -633,10 +637,9 @@
           </a:lstStyle>
           <a:p>
             <a:r>
-              <a:rPr lang="en-US" smtClean="0"/>
+              <a:rPr lang="en-US"/>
               <a:t>Click to edit Master subtitle style</a:t>
             </a:r>
-            <a:endParaRPr lang="en-US"/>
           </a:p>
         </p:txBody>
       </p:sp>
@@ -657,7 +660,7 @@
           <a:p>
             <a:fld id="{78C97017-6FC3-485B-9764-EAC9E56C1D49}" type="datetimeFigureOut">
               <a:rPr lang="en-US" smtClean="0"/>
-              <a:t>11/9/2017</a:t>
+              <a:t>11-Nov-17</a:t>
             </a:fld>
             <a:endParaRPr lang="en-US"/>
           </a:p>
@@ -751,10 +754,9 @@
           <a:lstStyle/>
           <a:p>
             <a:r>
-              <a:rPr lang="en-US" smtClean="0"/>
+              <a:rPr lang="en-US"/>
               <a:t>Click to edit Master title style</a:t>
             </a:r>
-            <a:endParaRPr lang="en-US"/>
           </a:p>
         </p:txBody>
       </p:sp>
@@ -775,38 +777,37 @@
           <a:p>
             <a:pPr lvl="0"/>
             <a:r>
-              <a:rPr lang="en-US" smtClean="0"/>
+              <a:rPr lang="en-US"/>
               <a:t>Click to edit Master text styles</a:t>
             </a:r>
           </a:p>
           <a:p>
             <a:pPr lvl="1"/>
             <a:r>
-              <a:rPr lang="en-US" smtClean="0"/>
+              <a:rPr lang="en-US"/>
               <a:t>Second level</a:t>
             </a:r>
           </a:p>
           <a:p>
             <a:pPr lvl="2"/>
             <a:r>
-              <a:rPr lang="en-US" smtClean="0"/>
+              <a:rPr lang="en-US"/>
               <a:t>Third level</a:t>
             </a:r>
           </a:p>
           <a:p>
             <a:pPr lvl="3"/>
             <a:r>
-              <a:rPr lang="en-US" smtClean="0"/>
+              <a:rPr lang="en-US"/>
               <a:t>Fourth level</a:t>
             </a:r>
           </a:p>
           <a:p>
             <a:pPr lvl="4"/>
             <a:r>
-              <a:rPr lang="en-US" smtClean="0"/>
+              <a:rPr lang="en-US"/>
               <a:t>Fifth level</a:t>
             </a:r>
-            <a:endParaRPr lang="en-US"/>
           </a:p>
         </p:txBody>
       </p:sp>
@@ -827,7 +828,7 @@
           <a:p>
             <a:fld id="{78C97017-6FC3-485B-9764-EAC9E56C1D49}" type="datetimeFigureOut">
               <a:rPr lang="en-US" smtClean="0"/>
-              <a:t>11/9/2017</a:t>
+              <a:t>11-Nov-17</a:t>
             </a:fld>
             <a:endParaRPr lang="en-US"/>
           </a:p>
@@ -926,10 +927,9 @@
           <a:lstStyle/>
           <a:p>
             <a:r>
-              <a:rPr lang="en-US" smtClean="0"/>
+              <a:rPr lang="en-US"/>
               <a:t>Click to edit Master title style</a:t>
             </a:r>
-            <a:endParaRPr lang="en-US"/>
           </a:p>
         </p:txBody>
       </p:sp>
@@ -955,38 +955,37 @@
           <a:p>
             <a:pPr lvl="0"/>
             <a:r>
-              <a:rPr lang="en-US" smtClean="0"/>
+              <a:rPr lang="en-US"/>
               <a:t>Click to edit Master text styles</a:t>
             </a:r>
           </a:p>
           <a:p>
             <a:pPr lvl="1"/>
             <a:r>
-              <a:rPr lang="en-US" smtClean="0"/>
+              <a:rPr lang="en-US"/>
               <a:t>Second level</a:t>
             </a:r>
           </a:p>
           <a:p>
             <a:pPr lvl="2"/>
             <a:r>
-              <a:rPr lang="en-US" smtClean="0"/>
+              <a:rPr lang="en-US"/>
               <a:t>Third level</a:t>
             </a:r>
           </a:p>
           <a:p>
             <a:pPr lvl="3"/>
             <a:r>
-              <a:rPr lang="en-US" smtClean="0"/>
+              <a:rPr lang="en-US"/>
               <a:t>Fourth level</a:t>
             </a:r>
           </a:p>
           <a:p>
             <a:pPr lvl="4"/>
             <a:r>
-              <a:rPr lang="en-US" smtClean="0"/>
+              <a:rPr lang="en-US"/>
               <a:t>Fifth level</a:t>
             </a:r>
-            <a:endParaRPr lang="en-US"/>
           </a:p>
         </p:txBody>
       </p:sp>
@@ -1007,7 +1006,7 @@
           <a:p>
             <a:fld id="{78C97017-6FC3-485B-9764-EAC9E56C1D49}" type="datetimeFigureOut">
               <a:rPr lang="en-US" smtClean="0"/>
-              <a:t>11/9/2017</a:t>
+              <a:t>11-Nov-17</a:t>
             </a:fld>
             <a:endParaRPr lang="en-US"/>
           </a:p>
@@ -1101,10 +1100,9 @@
           <a:lstStyle/>
           <a:p>
             <a:r>
-              <a:rPr lang="en-US" smtClean="0"/>
+              <a:rPr lang="en-US"/>
               <a:t>Click to edit Master title style</a:t>
             </a:r>
-            <a:endParaRPr lang="en-US"/>
           </a:p>
         </p:txBody>
       </p:sp>
@@ -1125,38 +1123,37 @@
           <a:p>
             <a:pPr lvl="0"/>
             <a:r>
-              <a:rPr lang="en-US" smtClean="0"/>
+              <a:rPr lang="en-US"/>
               <a:t>Click to edit Master text styles</a:t>
             </a:r>
           </a:p>
           <a:p>
             <a:pPr lvl="1"/>
             <a:r>
-              <a:rPr lang="en-US" smtClean="0"/>
+              <a:rPr lang="en-US"/>
               <a:t>Second level</a:t>
             </a:r>
           </a:p>
           <a:p>
             <a:pPr lvl="2"/>
             <a:r>
-              <a:rPr lang="en-US" smtClean="0"/>
+              <a:rPr lang="en-US"/>
               <a:t>Third level</a:t>
             </a:r>
           </a:p>
           <a:p>
             <a:pPr lvl="3"/>
             <a:r>
-              <a:rPr lang="en-US" smtClean="0"/>
+              <a:rPr lang="en-US"/>
               <a:t>Fourth level</a:t>
             </a:r>
           </a:p>
           <a:p>
             <a:pPr lvl="4"/>
             <a:r>
-              <a:rPr lang="en-US" smtClean="0"/>
+              <a:rPr lang="en-US"/>
               <a:t>Fifth level</a:t>
             </a:r>
-            <a:endParaRPr lang="en-US"/>
           </a:p>
         </p:txBody>
       </p:sp>
@@ -1177,7 +1174,7 @@
           <a:p>
             <a:fld id="{78C97017-6FC3-485B-9764-EAC9E56C1D49}" type="datetimeFigureOut">
               <a:rPr lang="en-US" smtClean="0"/>
-              <a:t>11/9/2017</a:t>
+              <a:t>11-Nov-17</a:t>
             </a:fld>
             <a:endParaRPr lang="en-US"/>
           </a:p>
@@ -1280,10 +1277,9 @@
           </a:lstStyle>
           <a:p>
             <a:r>
-              <a:rPr lang="en-US" smtClean="0"/>
+              <a:rPr lang="en-US"/>
               <a:t>Click to edit Master title style</a:t>
             </a:r>
-            <a:endParaRPr lang="en-US"/>
           </a:p>
         </p:txBody>
       </p:sp>
@@ -1400,7 +1396,7 @@
           <a:p>
             <a:pPr lvl="0"/>
             <a:r>
-              <a:rPr lang="en-US" smtClean="0"/>
+              <a:rPr lang="en-US"/>
               <a:t>Click to edit Master text styles</a:t>
             </a:r>
           </a:p>
@@ -1423,7 +1419,7 @@
           <a:p>
             <a:fld id="{78C97017-6FC3-485B-9764-EAC9E56C1D49}" type="datetimeFigureOut">
               <a:rPr lang="en-US" smtClean="0"/>
-              <a:t>11/9/2017</a:t>
+              <a:t>11-Nov-17</a:t>
             </a:fld>
             <a:endParaRPr lang="en-US"/>
           </a:p>
@@ -1517,10 +1513,9 @@
           <a:lstStyle/>
           <a:p>
             <a:r>
-              <a:rPr lang="en-US" smtClean="0"/>
+              <a:rPr lang="en-US"/>
               <a:t>Click to edit Master title style</a:t>
             </a:r>
-            <a:endParaRPr lang="en-US"/>
           </a:p>
         </p:txBody>
       </p:sp>
@@ -1574,38 +1569,37 @@
           <a:p>
             <a:pPr lvl="0"/>
             <a:r>
-              <a:rPr lang="en-US" smtClean="0"/>
+              <a:rPr lang="en-US"/>
               <a:t>Click to edit Master text styles</a:t>
             </a:r>
           </a:p>
           <a:p>
             <a:pPr lvl="1"/>
             <a:r>
-              <a:rPr lang="en-US" smtClean="0"/>
+              <a:rPr lang="en-US"/>
               <a:t>Second level</a:t>
             </a:r>
           </a:p>
           <a:p>
             <a:pPr lvl="2"/>
             <a:r>
-              <a:rPr lang="en-US" smtClean="0"/>
+              <a:rPr lang="en-US"/>
               <a:t>Third level</a:t>
             </a:r>
           </a:p>
           <a:p>
             <a:pPr lvl="3"/>
             <a:r>
-              <a:rPr lang="en-US" smtClean="0"/>
+              <a:rPr lang="en-US"/>
               <a:t>Fourth level</a:t>
             </a:r>
           </a:p>
           <a:p>
             <a:pPr lvl="4"/>
             <a:r>
-              <a:rPr lang="en-US" smtClean="0"/>
+              <a:rPr lang="en-US"/>
               <a:t>Fifth level</a:t>
             </a:r>
-            <a:endParaRPr lang="en-US"/>
           </a:p>
         </p:txBody>
       </p:sp>
@@ -1659,38 +1653,37 @@
           <a:p>
             <a:pPr lvl="0"/>
             <a:r>
-              <a:rPr lang="en-US" smtClean="0"/>
+              <a:rPr lang="en-US"/>
               <a:t>Click to edit Master text styles</a:t>
             </a:r>
           </a:p>
           <a:p>
             <a:pPr lvl="1"/>
             <a:r>
-              <a:rPr lang="en-US" smtClean="0"/>
+              <a:rPr lang="en-US"/>
               <a:t>Second level</a:t>
             </a:r>
           </a:p>
           <a:p>
             <a:pPr lvl="2"/>
             <a:r>
-              <a:rPr lang="en-US" smtClean="0"/>
+              <a:rPr lang="en-US"/>
               <a:t>Third level</a:t>
             </a:r>
           </a:p>
           <a:p>
             <a:pPr lvl="3"/>
             <a:r>
-              <a:rPr lang="en-US" smtClean="0"/>
+              <a:rPr lang="en-US"/>
               <a:t>Fourth level</a:t>
             </a:r>
           </a:p>
           <a:p>
             <a:pPr lvl="4"/>
             <a:r>
-              <a:rPr lang="en-US" smtClean="0"/>
+              <a:rPr lang="en-US"/>
               <a:t>Fifth level</a:t>
             </a:r>
-            <a:endParaRPr lang="en-US"/>
           </a:p>
         </p:txBody>
       </p:sp>
@@ -1711,7 +1704,7 @@
           <a:p>
             <a:fld id="{78C97017-6FC3-485B-9764-EAC9E56C1D49}" type="datetimeFigureOut">
               <a:rPr lang="en-US" smtClean="0"/>
-              <a:t>11/9/2017</a:t>
+              <a:t>11-Nov-17</a:t>
             </a:fld>
             <a:endParaRPr lang="en-US"/>
           </a:p>
@@ -1809,10 +1802,9 @@
           </a:lstStyle>
           <a:p>
             <a:r>
-              <a:rPr lang="en-US" smtClean="0"/>
+              <a:rPr lang="en-US"/>
               <a:t>Click to edit Master title style</a:t>
             </a:r>
-            <a:endParaRPr lang="en-US"/>
           </a:p>
         </p:txBody>
       </p:sp>
@@ -1875,7 +1867,7 @@
           <a:p>
             <a:pPr lvl="0"/>
             <a:r>
-              <a:rPr lang="en-US" smtClean="0"/>
+              <a:rPr lang="en-US"/>
               <a:t>Click to edit Master text styles</a:t>
             </a:r>
           </a:p>
@@ -1931,38 +1923,37 @@
           <a:p>
             <a:pPr lvl="0"/>
             <a:r>
-              <a:rPr lang="en-US" smtClean="0"/>
+              <a:rPr lang="en-US"/>
               <a:t>Click to edit Master text styles</a:t>
             </a:r>
           </a:p>
           <a:p>
             <a:pPr lvl="1"/>
             <a:r>
-              <a:rPr lang="en-US" smtClean="0"/>
+              <a:rPr lang="en-US"/>
               <a:t>Second level</a:t>
             </a:r>
           </a:p>
           <a:p>
             <a:pPr lvl="2"/>
             <a:r>
-              <a:rPr lang="en-US" smtClean="0"/>
+              <a:rPr lang="en-US"/>
               <a:t>Third level</a:t>
             </a:r>
           </a:p>
           <a:p>
             <a:pPr lvl="3"/>
             <a:r>
-              <a:rPr lang="en-US" smtClean="0"/>
+              <a:rPr lang="en-US"/>
               <a:t>Fourth level</a:t>
             </a:r>
           </a:p>
           <a:p>
             <a:pPr lvl="4"/>
             <a:r>
-              <a:rPr lang="en-US" smtClean="0"/>
+              <a:rPr lang="en-US"/>
               <a:t>Fifth level</a:t>
             </a:r>
-            <a:endParaRPr lang="en-US"/>
           </a:p>
         </p:txBody>
       </p:sp>
@@ -2025,7 +2016,7 @@
           <a:p>
             <a:pPr lvl="0"/>
             <a:r>
-              <a:rPr lang="en-US" smtClean="0"/>
+              <a:rPr lang="en-US"/>
               <a:t>Click to edit Master text styles</a:t>
             </a:r>
           </a:p>
@@ -2081,38 +2072,37 @@
           <a:p>
             <a:pPr lvl="0"/>
             <a:r>
-              <a:rPr lang="en-US" smtClean="0"/>
+              <a:rPr lang="en-US"/>
               <a:t>Click to edit Master text styles</a:t>
             </a:r>
           </a:p>
           <a:p>
             <a:pPr lvl="1"/>
             <a:r>
-              <a:rPr lang="en-US" smtClean="0"/>
+              <a:rPr lang="en-US"/>
               <a:t>Second level</a:t>
             </a:r>
           </a:p>
           <a:p>
             <a:pPr lvl="2"/>
             <a:r>
-              <a:rPr lang="en-US" smtClean="0"/>
+              <a:rPr lang="en-US"/>
               <a:t>Third level</a:t>
             </a:r>
           </a:p>
           <a:p>
             <a:pPr lvl="3"/>
             <a:r>
-              <a:rPr lang="en-US" smtClean="0"/>
+              <a:rPr lang="en-US"/>
               <a:t>Fourth level</a:t>
             </a:r>
           </a:p>
           <a:p>
             <a:pPr lvl="4"/>
             <a:r>
-              <a:rPr lang="en-US" smtClean="0"/>
+              <a:rPr lang="en-US"/>
               <a:t>Fifth level</a:t>
             </a:r>
-            <a:endParaRPr lang="en-US"/>
           </a:p>
         </p:txBody>
       </p:sp>
@@ -2133,7 +2123,7 @@
           <a:p>
             <a:fld id="{78C97017-6FC3-485B-9764-EAC9E56C1D49}" type="datetimeFigureOut">
               <a:rPr lang="en-US" smtClean="0"/>
-              <a:t>11/9/2017</a:t>
+              <a:t>11-Nov-17</a:t>
             </a:fld>
             <a:endParaRPr lang="en-US"/>
           </a:p>
@@ -2227,10 +2217,9 @@
           <a:lstStyle/>
           <a:p>
             <a:r>
-              <a:rPr lang="en-US" smtClean="0"/>
+              <a:rPr lang="en-US"/>
               <a:t>Click to edit Master title style</a:t>
             </a:r>
-            <a:endParaRPr lang="en-US"/>
           </a:p>
         </p:txBody>
       </p:sp>
@@ -2251,7 +2240,7 @@
           <a:p>
             <a:fld id="{78C97017-6FC3-485B-9764-EAC9E56C1D49}" type="datetimeFigureOut">
               <a:rPr lang="en-US" smtClean="0"/>
-              <a:t>11/9/2017</a:t>
+              <a:t>11-Nov-17</a:t>
             </a:fld>
             <a:endParaRPr lang="en-US"/>
           </a:p>
@@ -2346,7 +2335,7 @@
           <a:p>
             <a:fld id="{78C97017-6FC3-485B-9764-EAC9E56C1D49}" type="datetimeFigureOut">
               <a:rPr lang="en-US" smtClean="0"/>
-              <a:t>11/9/2017</a:t>
+              <a:t>11-Nov-17</a:t>
             </a:fld>
             <a:endParaRPr lang="en-US"/>
           </a:p>
@@ -2449,10 +2438,9 @@
           </a:lstStyle>
           <a:p>
             <a:r>
-              <a:rPr lang="en-US" smtClean="0"/>
+              <a:rPr lang="en-US"/>
               <a:t>Click to edit Master title style</a:t>
             </a:r>
-            <a:endParaRPr lang="en-US"/>
           </a:p>
         </p:txBody>
       </p:sp>
@@ -2506,38 +2494,37 @@
           <a:p>
             <a:pPr lvl="0"/>
             <a:r>
-              <a:rPr lang="en-US" smtClean="0"/>
+              <a:rPr lang="en-US"/>
               <a:t>Click to edit Master text styles</a:t>
             </a:r>
           </a:p>
           <a:p>
             <a:pPr lvl="1"/>
             <a:r>
-              <a:rPr lang="en-US" smtClean="0"/>
+              <a:rPr lang="en-US"/>
               <a:t>Second level</a:t>
             </a:r>
           </a:p>
           <a:p>
             <a:pPr lvl="2"/>
             <a:r>
-              <a:rPr lang="en-US" smtClean="0"/>
+              <a:rPr lang="en-US"/>
               <a:t>Third level</a:t>
             </a:r>
           </a:p>
           <a:p>
             <a:pPr lvl="3"/>
             <a:r>
-              <a:rPr lang="en-US" smtClean="0"/>
+              <a:rPr lang="en-US"/>
               <a:t>Fourth level</a:t>
             </a:r>
           </a:p>
           <a:p>
             <a:pPr lvl="4"/>
             <a:r>
-              <a:rPr lang="en-US" smtClean="0"/>
+              <a:rPr lang="en-US"/>
               <a:t>Fifth level</a:t>
             </a:r>
-            <a:endParaRPr lang="en-US"/>
           </a:p>
         </p:txBody>
       </p:sp>
@@ -2600,7 +2587,7 @@
           <a:p>
             <a:pPr lvl="0"/>
             <a:r>
-              <a:rPr lang="en-US" smtClean="0"/>
+              <a:rPr lang="en-US"/>
               <a:t>Click to edit Master text styles</a:t>
             </a:r>
           </a:p>
@@ -2623,7 +2610,7 @@
           <a:p>
             <a:fld id="{78C97017-6FC3-485B-9764-EAC9E56C1D49}" type="datetimeFigureOut">
               <a:rPr lang="en-US" smtClean="0"/>
-              <a:t>11/9/2017</a:t>
+              <a:t>11-Nov-17</a:t>
             </a:fld>
             <a:endParaRPr lang="en-US"/>
           </a:p>
@@ -2726,10 +2713,9 @@
           </a:lstStyle>
           <a:p>
             <a:r>
-              <a:rPr lang="en-US" smtClean="0"/>
+              <a:rPr lang="en-US"/>
               <a:t>Click to edit Master title style</a:t>
             </a:r>
-            <a:endParaRPr lang="en-US"/>
           </a:p>
         </p:txBody>
       </p:sp>
@@ -2853,7 +2839,7 @@
           <a:p>
             <a:pPr lvl="0"/>
             <a:r>
-              <a:rPr lang="en-US" smtClean="0"/>
+              <a:rPr lang="en-US"/>
               <a:t>Click to edit Master text styles</a:t>
             </a:r>
           </a:p>
@@ -2876,7 +2862,7 @@
           <a:p>
             <a:fld id="{78C97017-6FC3-485B-9764-EAC9E56C1D49}" type="datetimeFigureOut">
               <a:rPr lang="en-US" smtClean="0"/>
-              <a:t>11/9/2017</a:t>
+              <a:t>11-Nov-17</a:t>
             </a:fld>
             <a:endParaRPr lang="en-US"/>
           </a:p>
@@ -2985,10 +2971,9 @@
           <a:lstStyle/>
           <a:p>
             <a:r>
-              <a:rPr lang="en-US" smtClean="0"/>
+              <a:rPr lang="en-US"/>
               <a:t>Click to edit Master title style</a:t>
             </a:r>
-            <a:endParaRPr lang="en-US"/>
           </a:p>
         </p:txBody>
       </p:sp>
@@ -3019,38 +3004,37 @@
           <a:p>
             <a:pPr lvl="0"/>
             <a:r>
-              <a:rPr lang="en-US" smtClean="0"/>
+              <a:rPr lang="en-US"/>
               <a:t>Click to edit Master text styles</a:t>
             </a:r>
           </a:p>
           <a:p>
             <a:pPr lvl="1"/>
             <a:r>
-              <a:rPr lang="en-US" smtClean="0"/>
+              <a:rPr lang="en-US"/>
               <a:t>Second level</a:t>
             </a:r>
           </a:p>
           <a:p>
             <a:pPr lvl="2"/>
             <a:r>
-              <a:rPr lang="en-US" smtClean="0"/>
+              <a:rPr lang="en-US"/>
               <a:t>Third level</a:t>
             </a:r>
           </a:p>
           <a:p>
             <a:pPr lvl="3"/>
             <a:r>
-              <a:rPr lang="en-US" smtClean="0"/>
+              <a:rPr lang="en-US"/>
               <a:t>Fourth level</a:t>
             </a:r>
           </a:p>
           <a:p>
             <a:pPr lvl="4"/>
             <a:r>
-              <a:rPr lang="en-US" smtClean="0"/>
+              <a:rPr lang="en-US"/>
               <a:t>Fifth level</a:t>
             </a:r>
-            <a:endParaRPr lang="en-US"/>
           </a:p>
         </p:txBody>
       </p:sp>
@@ -3089,7 +3073,7 @@
           <a:p>
             <a:fld id="{78C97017-6FC3-485B-9764-EAC9E56C1D49}" type="datetimeFigureOut">
               <a:rPr lang="en-US" smtClean="0"/>
-              <a:t>11/9/2017</a:t>
+              <a:t>11-Nov-17</a:t>
             </a:fld>
             <a:endParaRPr lang="en-US"/>
           </a:p>
@@ -3472,18 +3456,18 @@
         </p:nvSpPr>
         <p:spPr>
           <a:xfrm>
-            <a:off x="1111860" y="607926"/>
-            <a:ext cx="1093635" cy="346760"/>
+            <a:off x="2324169" y="1798278"/>
+            <a:ext cx="1455629" cy="346760"/>
           </a:xfrm>
           <a:prstGeom prst="rect">
             <a:avLst/>
           </a:prstGeom>
           <a:solidFill>
-            <a:srgbClr val="00B050"/>
+            <a:srgbClr val="0070C0"/>
           </a:solidFill>
           <a:ln w="19050">
             <a:solidFill>
-              <a:srgbClr val="00B050"/>
+              <a:srgbClr val="0070C0"/>
             </a:solidFill>
           </a:ln>
           <a:effectLst/>
@@ -3508,12 +3492,20 @@
           <a:p>
             <a:pPr algn="ctr"/>
             <a:r>
-              <a:rPr lang="en-US" sz="1600" dirty="0" smtClean="0">
+              <a:rPr lang="en-US" sz="1600" dirty="0">
                 <a:solidFill>
                   <a:schemeClr val="bg1"/>
                 </a:solidFill>
               </a:rPr>
-              <a:t>:UI</a:t>
+              <a:t>:</a:t>
+            </a:r>
+            <a:r>
+              <a:rPr lang="en-US" sz="1600" dirty="0" err="1">
+                <a:solidFill>
+                  <a:schemeClr val="bg1"/>
+                </a:solidFill>
+              </a:rPr>
+              <a:t>LogicManager</a:t>
             </a:r>
             <a:endParaRPr lang="en-SG" sz="1600" dirty="0">
               <a:solidFill>
@@ -3526,20 +3518,22 @@
       <p:cxnSp>
         <p:nvCxnSpPr>
           <p:cNvPr id="5" name="Straight Connector 4"/>
-          <p:cNvCxnSpPr/>
+          <p:cNvCxnSpPr>
+            <a:cxnSpLocks/>
+          </p:cNvCxnSpPr>
           <p:nvPr/>
         </p:nvCxnSpPr>
         <p:spPr>
           <a:xfrm>
-            <a:off x="1658677" y="971597"/>
-            <a:ext cx="4192" cy="2914603"/>
+            <a:off x="3051983" y="2161949"/>
+            <a:ext cx="0" cy="3481399"/>
           </a:xfrm>
           <a:prstGeom prst="line">
             <a:avLst/>
           </a:prstGeom>
           <a:ln w="19050">
             <a:solidFill>
-              <a:srgbClr val="00B050"/>
+              <a:srgbClr val="0070C0"/>
             </a:solidFill>
             <a:prstDash val="sysDash"/>
           </a:ln>
@@ -3568,18 +3562,18 @@
         </p:nvSpPr>
         <p:spPr>
           <a:xfrm>
-            <a:off x="1552773" y="1322292"/>
-            <a:ext cx="186296" cy="1725708"/>
+            <a:off x="2979975" y="2512643"/>
+            <a:ext cx="152400" cy="2932689"/>
           </a:xfrm>
           <a:prstGeom prst="rect">
             <a:avLst/>
           </a:prstGeom>
           <a:solidFill>
-            <a:srgbClr val="00B050"/>
+            <a:srgbClr val="0070C0"/>
           </a:solidFill>
           <a:ln>
             <a:solidFill>
-              <a:srgbClr val="00B050"/>
+              <a:srgbClr val="0070C0"/>
             </a:solidFill>
           </a:ln>
           <a:effectLst/>
@@ -3603,231 +3597,10 @@
           <a:lstStyle/>
           <a:p>
             <a:pPr algn="ctr"/>
-            <a:endParaRPr lang="en-SG" sz="1400">
-              <a:solidFill>
-                <a:schemeClr val="dk1"/>
-              </a:solidFill>
-            </a:endParaRPr>
-          </a:p>
-        </p:txBody>
-      </p:sp>
-      <p:grpSp>
-        <p:nvGrpSpPr>
-          <p:cNvPr id="7" name="Actor"/>
-          <p:cNvGrpSpPr/>
-          <p:nvPr/>
-        </p:nvGrpSpPr>
-        <p:grpSpPr>
-          <a:xfrm>
-            <a:off x="152400" y="533400"/>
-            <a:ext cx="324036" cy="573410"/>
-            <a:chOff x="3239901" y="4149080"/>
-            <a:chExt cx="648072" cy="1146820"/>
-          </a:xfrm>
-        </p:grpSpPr>
-        <p:sp>
-          <p:nvSpPr>
-            <p:cNvPr id="8" name="Flowchart: Connector 7"/>
-            <p:cNvSpPr/>
-            <p:nvPr/>
-          </p:nvSpPr>
-          <p:spPr>
-            <a:xfrm>
-              <a:off x="3419872" y="4149080"/>
-              <a:ext cx="288032" cy="288032"/>
-            </a:xfrm>
-            <a:prstGeom prst="flowChartConnector">
-              <a:avLst/>
-            </a:prstGeom>
-            <a:solidFill>
-              <a:schemeClr val="bg1">
-                <a:lumMod val="85000"/>
-              </a:schemeClr>
-            </a:solidFill>
-            <a:ln w="28575">
-              <a:solidFill>
-                <a:schemeClr val="tx1"/>
-              </a:solidFill>
-            </a:ln>
-            <a:effectLst/>
-          </p:spPr>
-          <p:style>
-            <a:lnRef idx="1">
-              <a:schemeClr val="accent4"/>
-            </a:lnRef>
-            <a:fillRef idx="2">
-              <a:schemeClr val="accent4"/>
-            </a:fillRef>
-            <a:effectRef idx="1">
-              <a:schemeClr val="accent4"/>
-            </a:effectRef>
-            <a:fontRef idx="minor">
-              <a:schemeClr val="dk1"/>
-            </a:fontRef>
-          </p:style>
-          <p:txBody>
-            <a:bodyPr rtlCol="0" anchor="ctr"/>
-            <a:lstStyle/>
-            <a:p>
-              <a:pPr algn="ctr"/>
-              <a:endParaRPr lang="en-SG"/>
-            </a:p>
-          </p:txBody>
-        </p:sp>
-        <p:cxnSp>
-          <p:nvCxnSpPr>
-            <p:cNvPr id="9" name="Straight Connector 8"/>
-            <p:cNvCxnSpPr>
-              <a:stCxn id="8" idx="4"/>
-            </p:cNvCxnSpPr>
-            <p:nvPr/>
-          </p:nvCxnSpPr>
-          <p:spPr>
-            <a:xfrm>
-              <a:off x="3563888" y="4437112"/>
-              <a:ext cx="0" cy="504056"/>
-            </a:xfrm>
-            <a:prstGeom prst="line">
-              <a:avLst/>
-            </a:prstGeom>
-            <a:ln w="28575">
-              <a:solidFill>
-                <a:schemeClr val="tx1"/>
-              </a:solidFill>
-            </a:ln>
-            <a:effectLst/>
-          </p:spPr>
-          <p:style>
-            <a:lnRef idx="1">
-              <a:schemeClr val="accent4"/>
-            </a:lnRef>
-            <a:fillRef idx="2">
-              <a:schemeClr val="accent4"/>
-            </a:fillRef>
-            <a:effectRef idx="1">
-              <a:schemeClr val="accent4"/>
-            </a:effectRef>
-            <a:fontRef idx="minor">
-              <a:schemeClr val="dk1"/>
-            </a:fontRef>
-          </p:style>
-        </p:cxnSp>
-        <p:sp>
-          <p:nvSpPr>
-            <p:cNvPr id="10" name="Freeform 9"/>
-            <p:cNvSpPr/>
-            <p:nvPr/>
-          </p:nvSpPr>
-          <p:spPr>
-            <a:xfrm>
-              <a:off x="3324225" y="4933950"/>
-              <a:ext cx="479425" cy="361950"/>
-            </a:xfrm>
-            <a:custGeom>
-              <a:avLst/>
-              <a:gdLst>
-                <a:gd name="connsiteX0" fmla="*/ 0 w 479425"/>
-                <a:gd name="connsiteY0" fmla="*/ 355600 h 361950"/>
-                <a:gd name="connsiteX1" fmla="*/ 241300 w 479425"/>
-                <a:gd name="connsiteY1" fmla="*/ 0 h 361950"/>
-                <a:gd name="connsiteX2" fmla="*/ 479425 w 479425"/>
-                <a:gd name="connsiteY2" fmla="*/ 361950 h 361950"/>
-              </a:gdLst>
-              <a:ahLst/>
-              <a:cxnLst>
-                <a:cxn ang="0">
-                  <a:pos x="connsiteX0" y="connsiteY0"/>
-                </a:cxn>
-                <a:cxn ang="0">
-                  <a:pos x="connsiteX1" y="connsiteY1"/>
-                </a:cxn>
-                <a:cxn ang="0">
-                  <a:pos x="connsiteX2" y="connsiteY2"/>
-                </a:cxn>
-              </a:cxnLst>
-              <a:rect l="l" t="t" r="r" b="b"/>
-              <a:pathLst>
-                <a:path w="479425" h="361950">
-                  <a:moveTo>
-                    <a:pt x="0" y="355600"/>
-                  </a:moveTo>
-                  <a:lnTo>
-                    <a:pt x="241300" y="0"/>
-                  </a:lnTo>
-                  <a:lnTo>
-                    <a:pt x="479425" y="361950"/>
-                  </a:lnTo>
-                </a:path>
-              </a:pathLst>
-            </a:custGeom>
-            <a:noFill/>
-            <a:ln w="28575">
-              <a:solidFill>
-                <a:schemeClr val="tx1"/>
-              </a:solidFill>
-            </a:ln>
-            <a:effectLst/>
-          </p:spPr>
-          <p:style>
-            <a:lnRef idx="1">
-              <a:schemeClr val="accent4"/>
-            </a:lnRef>
-            <a:fillRef idx="2">
-              <a:schemeClr val="accent4"/>
-            </a:fillRef>
-            <a:effectRef idx="1">
-              <a:schemeClr val="accent4"/>
-            </a:effectRef>
-            <a:fontRef idx="minor">
-              <a:schemeClr val="dk1"/>
-            </a:fontRef>
-          </p:style>
-          <p:txBody>
-            <a:bodyPr rtlCol="0" anchor="ctr"/>
-            <a:lstStyle/>
-            <a:p>
-              <a:pPr algn="ctr"/>
-              <a:endParaRPr lang="en-SG"/>
-            </a:p>
-          </p:txBody>
-        </p:sp>
-        <p:cxnSp>
-          <p:nvCxnSpPr>
-            <p:cNvPr id="11" name="Straight Connector 10"/>
-            <p:cNvCxnSpPr/>
-            <p:nvPr/>
-          </p:nvCxnSpPr>
-          <p:spPr>
-            <a:xfrm>
-              <a:off x="3239901" y="4509120"/>
-              <a:ext cx="648072" cy="0"/>
-            </a:xfrm>
-            <a:prstGeom prst="line">
-              <a:avLst/>
-            </a:prstGeom>
-            <a:ln w="28575">
-              <a:solidFill>
-                <a:schemeClr val="tx1"/>
-              </a:solidFill>
-            </a:ln>
-            <a:effectLst/>
-          </p:spPr>
-          <p:style>
-            <a:lnRef idx="1">
-              <a:schemeClr val="accent4"/>
-            </a:lnRef>
-            <a:fillRef idx="2">
-              <a:schemeClr val="accent4"/>
-            </a:fillRef>
-            <a:effectRef idx="1">
-              <a:schemeClr val="accent4"/>
-            </a:effectRef>
-            <a:fontRef idx="minor">
-              <a:schemeClr val="dk1"/>
-            </a:fontRef>
-          </p:style>
-        </p:cxnSp>
-      </p:grpSp>
+            <a:endParaRPr lang="en-SG" sz="1400"/>
+          </a:p>
+        </p:txBody>
+      </p:sp>
       <p:sp>
         <p:nvSpPr>
           <p:cNvPr id="16" name="Rectangle 62"/>
@@ -3836,8 +3609,8 @@
         </p:nvSpPr>
         <p:spPr>
           <a:xfrm>
-            <a:off x="3335583" y="611613"/>
-            <a:ext cx="1093635" cy="346760"/>
+            <a:off x="4878212" y="1677354"/>
+            <a:ext cx="1219200" cy="467684"/>
           </a:xfrm>
           <a:prstGeom prst="rect">
             <a:avLst/>
@@ -3872,12 +3645,23 @@
           <a:p>
             <a:pPr algn="ctr"/>
             <a:r>
-              <a:rPr lang="en-US" sz="1600" dirty="0" smtClean="0">
+              <a:rPr lang="en-US" sz="1600" dirty="0">
                 <a:solidFill>
                   <a:schemeClr val="bg1"/>
                 </a:solidFill>
               </a:rPr>
-              <a:t>:Logic</a:t>
+              <a:t>:Address</a:t>
+            </a:r>
+          </a:p>
+          <a:p>
+            <a:pPr algn="ctr"/>
+            <a:r>
+              <a:rPr lang="en-US" sz="1600" dirty="0" err="1">
+                <a:solidFill>
+                  <a:schemeClr val="bg1"/>
+                </a:solidFill>
+              </a:rPr>
+              <a:t>BookParser</a:t>
             </a:r>
             <a:endParaRPr lang="en-SG" sz="1600" dirty="0">
               <a:solidFill>
@@ -3890,13 +3674,15 @@
       <p:cxnSp>
         <p:nvCxnSpPr>
           <p:cNvPr id="17" name="Straight Connector 16"/>
-          <p:cNvCxnSpPr/>
+          <p:cNvCxnSpPr>
+            <a:cxnSpLocks/>
+          </p:cNvCxnSpPr>
           <p:nvPr/>
         </p:nvCxnSpPr>
         <p:spPr>
           <a:xfrm>
-            <a:off x="3882400" y="975284"/>
-            <a:ext cx="0" cy="1723059"/>
+            <a:off x="5491611" y="2161949"/>
+            <a:ext cx="0" cy="1482984"/>
           </a:xfrm>
           <a:prstGeom prst="line">
             <a:avLst/>
@@ -3932,8 +3718,8 @@
         </p:nvSpPr>
         <p:spPr>
           <a:xfrm>
-            <a:off x="3810392" y="1433477"/>
-            <a:ext cx="144016" cy="832525"/>
+            <a:off x="5419604" y="2620142"/>
+            <a:ext cx="154408" cy="767790"/>
           </a:xfrm>
           <a:prstGeom prst="rect">
             <a:avLst/>
@@ -3975,90 +3761,26 @@
           </a:p>
         </p:txBody>
       </p:sp>
-      <p:sp>
-        <p:nvSpPr>
-          <p:cNvPr id="19" name="Rectangle 62"/>
-          <p:cNvSpPr/>
-          <p:nvPr/>
-        </p:nvSpPr>
-        <p:spPr>
-          <a:xfrm>
-            <a:off x="5162746" y="607926"/>
-            <a:ext cx="1390453" cy="346760"/>
-          </a:xfrm>
-          <a:prstGeom prst="rect">
-            <a:avLst/>
-          </a:prstGeom>
-          <a:solidFill>
-            <a:srgbClr val="7030A0"/>
-          </a:solidFill>
-          <a:ln w="19050">
-            <a:solidFill>
-              <a:srgbClr val="7030A0"/>
-            </a:solidFill>
-          </a:ln>
-          <a:effectLst/>
-        </p:spPr>
-        <p:style>
-          <a:lnRef idx="1">
-            <a:schemeClr val="accent2"/>
-          </a:lnRef>
-          <a:fillRef idx="2">
-            <a:schemeClr val="accent2"/>
-          </a:fillRef>
-          <a:effectRef idx="1">
-            <a:schemeClr val="accent2"/>
-          </a:effectRef>
-          <a:fontRef idx="minor">
-            <a:schemeClr val="dk1"/>
-          </a:fontRef>
-        </p:style>
-        <p:txBody>
-          <a:bodyPr rtlCol="0" anchor="ctr"/>
-          <a:lstStyle/>
-          <a:p>
-            <a:pPr algn="ctr"/>
-            <a:r>
-              <a:rPr lang="en-US" sz="1600" dirty="0">
-                <a:solidFill>
-                  <a:schemeClr val="bg1"/>
-                </a:solidFill>
-              </a:rPr>
-              <a:t>:</a:t>
-            </a:r>
-            <a:r>
-              <a:rPr lang="en-US" sz="1600" dirty="0" err="1">
-                <a:solidFill>
-                  <a:schemeClr val="bg1"/>
-                </a:solidFill>
-              </a:rPr>
-              <a:t>EventsCenter</a:t>
-            </a:r>
-            <a:endParaRPr lang="en-SG" sz="1600" dirty="0">
-              <a:solidFill>
-                <a:schemeClr val="bg1"/>
-              </a:solidFill>
-            </a:endParaRPr>
-          </a:p>
-        </p:txBody>
-      </p:sp>
       <p:cxnSp>
         <p:nvCxnSpPr>
           <p:cNvPr id="20" name="Straight Connector 19"/>
-          <p:cNvCxnSpPr/>
+          <p:cNvCxnSpPr>
+            <a:cxnSpLocks/>
+            <a:stCxn id="21" idx="0"/>
+          </p:cNvCxnSpPr>
           <p:nvPr/>
         </p:nvCxnSpPr>
         <p:spPr>
           <a:xfrm>
-            <a:off x="5863600" y="971597"/>
-            <a:ext cx="0" cy="1723059"/>
+            <a:off x="7043106" y="2867965"/>
+            <a:ext cx="0" cy="2644578"/>
           </a:xfrm>
           <a:prstGeom prst="line">
             <a:avLst/>
           </a:prstGeom>
           <a:ln w="19050">
             <a:solidFill>
-              <a:srgbClr val="7030A0"/>
+              <a:srgbClr val="0070C0"/>
             </a:solidFill>
             <a:prstDash val="sysDash"/>
           </a:ln>
@@ -4087,18 +3809,18 @@
         </p:nvSpPr>
         <p:spPr>
           <a:xfrm>
-            <a:off x="5791592" y="1538408"/>
-            <a:ext cx="142006" cy="518992"/>
+            <a:off x="6966906" y="2867965"/>
+            <a:ext cx="152400" cy="276003"/>
           </a:xfrm>
           <a:prstGeom prst="rect">
             <a:avLst/>
           </a:prstGeom>
           <a:solidFill>
-            <a:srgbClr val="7030A0"/>
+            <a:srgbClr val="0070C0"/>
           </a:solidFill>
           <a:ln>
             <a:solidFill>
-              <a:srgbClr val="7030A0"/>
+              <a:srgbClr val="0070C0"/>
             </a:solidFill>
           </a:ln>
           <a:effectLst/>
@@ -4122,11 +3844,7 @@
           <a:lstStyle/>
           <a:p>
             <a:pPr algn="ctr"/>
-            <a:endParaRPr lang="en-SG" sz="1400">
-              <a:solidFill>
-                <a:schemeClr val="dk1"/>
-              </a:solidFill>
-            </a:endParaRPr>
+            <a:endParaRPr lang="en-SG" sz="1400"/>
           </a:p>
         </p:txBody>
       </p:sp>
@@ -4138,7 +3856,7 @@
         </p:nvCxnSpPr>
         <p:spPr>
           <a:xfrm>
-            <a:off x="466818" y="1325979"/>
+            <a:off x="1860124" y="2516331"/>
             <a:ext cx="1119851" cy="0"/>
           </a:xfrm>
           <a:prstGeom prst="straightConnector1">
@@ -4146,7 +3864,7 @@
           </a:prstGeom>
           <a:ln w="19050">
             <a:solidFill>
-              <a:schemeClr val="tx1"/>
+              <a:srgbClr val="00B050"/>
             </a:solidFill>
             <a:tailEnd type="arrow"/>
           </a:ln>
@@ -4168,14 +3886,14 @@
       </p:cxnSp>
       <p:sp>
         <p:nvSpPr>
-          <p:cNvPr id="24" name="TextBox 23"/>
+          <p:cNvPr id="26" name="TextBox 25"/>
           <p:cNvSpPr txBox="1"/>
           <p:nvPr/>
         </p:nvSpPr>
         <p:spPr>
           <a:xfrm>
-            <a:off x="466818" y="1345880"/>
-            <a:ext cx="860170" cy="215444"/>
+            <a:off x="1288626" y="2244932"/>
+            <a:ext cx="1615344" cy="215444"/>
           </a:xfrm>
           <a:prstGeom prst="rect">
             <a:avLst/>
@@ -4188,39 +3906,51 @@
           </a:bodyPr>
           <a:lstStyle/>
           <a:p>
-            <a:r>
-              <a:rPr lang="en-US" sz="1400" dirty="0" err="1" smtClean="0"/>
+            <a:pPr algn="r"/>
+            <a:r>
+              <a:rPr lang="en-US" sz="1400" dirty="0">
+                <a:solidFill>
+                  <a:srgbClr val="0070C0"/>
+                </a:solidFill>
+              </a:rPr>
+              <a:t>execute(“</a:t>
+            </a:r>
+            <a:r>
+              <a:rPr lang="en-US" sz="1400" dirty="0" err="1">
+                <a:solidFill>
+                  <a:srgbClr val="0070C0"/>
+                </a:solidFill>
+              </a:rPr>
               <a:t>gmap</a:t>
             </a:r>
             <a:r>
-              <a:rPr lang="en-US" sz="1400" dirty="0" smtClean="0"/>
-              <a:t> </a:t>
-            </a:r>
-            <a:r>
-              <a:rPr lang="en-US" sz="1400" dirty="0" smtClean="0"/>
-              <a:t>1</a:t>
-            </a:r>
-            <a:endParaRPr lang="en-US" sz="1400" dirty="0"/>
+              <a:rPr lang="en-US" sz="1400" dirty="0">
+                <a:solidFill>
+                  <a:srgbClr val="0070C0"/>
+                </a:solidFill>
+              </a:rPr>
+              <a:t> 1”)</a:t>
+            </a:r>
           </a:p>
         </p:txBody>
       </p:sp>
       <p:cxnSp>
         <p:nvCxnSpPr>
-          <p:cNvPr id="25" name="Straight Arrow Connector 24"/>
+          <p:cNvPr id="28" name="Straight Arrow Connector 27"/>
           <p:cNvCxnSpPr/>
           <p:nvPr/>
         </p:nvCxnSpPr>
         <p:spPr>
-          <a:xfrm>
-            <a:off x="1739069" y="1433478"/>
-            <a:ext cx="2071323" cy="0"/>
+          <a:xfrm flipV="1">
+            <a:off x="5576996" y="2766672"/>
+            <a:ext cx="922392" cy="1"/>
           </a:xfrm>
           <a:prstGeom prst="straightConnector1">
             <a:avLst/>
           </a:prstGeom>
           <a:ln w="19050">
             <a:solidFill>
-              <a:srgbClr val="00B050"/>
+              <a:srgbClr val="0070C0"/>
             </a:solidFill>
             <a:tailEnd type="arrow"/>
           </a:ln>
@@ -4242,14 +3972,14 @@
       </p:cxnSp>
       <p:sp>
         <p:nvSpPr>
-          <p:cNvPr id="26" name="TextBox 25"/>
+          <p:cNvPr id="29" name="TextBox 28"/>
           <p:cNvSpPr txBox="1"/>
           <p:nvPr/>
         </p:nvSpPr>
         <p:spPr>
           <a:xfrm>
-            <a:off x="2166172" y="1453379"/>
-            <a:ext cx="1424846" cy="215444"/>
+            <a:off x="4684445" y="3738403"/>
+            <a:ext cx="855809" cy="215444"/>
           </a:xfrm>
           <a:prstGeom prst="rect">
             <a:avLst/>
@@ -4260,66 +3990,36 @@
           <a:bodyPr wrap="square" lIns="0" tIns="0" rIns="0" bIns="0" rtlCol="0">
             <a:spAutoFit/>
           </a:bodyPr>
-          <a:lstStyle/>
-          <a:p>
-            <a:r>
-              <a:rPr lang="en-US" sz="1400" dirty="0" smtClean="0">
+          <a:lstStyle>
+            <a:defPPr>
+              <a:defRPr lang="en-US"/>
+            </a:defPPr>
+            <a:lvl1pPr algn="r">
+              <a:defRPr sz="1400">
                 <a:solidFill>
                   <a:srgbClr val="0070C0"/>
                 </a:solidFill>
-              </a:rPr>
-              <a:t>execute</a:t>
-            </a:r>
-            <a:r>
-              <a:rPr lang="en-US" sz="1400" dirty="0" smtClean="0">
-                <a:solidFill>
-                  <a:srgbClr val="0070C0"/>
-                </a:solidFill>
-              </a:rPr>
-              <a:t>(“</a:t>
-            </a:r>
-            <a:r>
-              <a:rPr lang="en-US" sz="1400" dirty="0" err="1" smtClean="0">
-                <a:solidFill>
-                  <a:srgbClr val="0070C0"/>
-                </a:solidFill>
-              </a:rPr>
-              <a:t>gmap</a:t>
-            </a:r>
-            <a:r>
-              <a:rPr lang="en-US" sz="1400" dirty="0" smtClean="0">
-                <a:solidFill>
-                  <a:srgbClr val="0070C0"/>
-                </a:solidFill>
-              </a:rPr>
-              <a:t> </a:t>
-            </a:r>
-            <a:r>
-              <a:rPr lang="en-US" sz="1400" dirty="0" smtClean="0">
-                <a:solidFill>
-                  <a:srgbClr val="0070C0"/>
-                </a:solidFill>
-              </a:rPr>
-              <a:t>1”)</a:t>
-            </a:r>
-            <a:endParaRPr lang="en-US" sz="1400" dirty="0">
-              <a:solidFill>
-                <a:srgbClr val="0070C0"/>
-              </a:solidFill>
-            </a:endParaRPr>
+              </a:defRPr>
+            </a:lvl1pPr>
+          </a:lstStyle>
+          <a:p>
+            <a:r>
+              <a:rPr lang="en-US" dirty="0"/>
+              <a:t>execute()</a:t>
+            </a:r>
           </a:p>
         </p:txBody>
       </p:sp>
       <p:cxnSp>
         <p:nvCxnSpPr>
-          <p:cNvPr id="28" name="Straight Arrow Connector 27"/>
+          <p:cNvPr id="34" name="Straight Arrow Connector 33"/>
           <p:cNvCxnSpPr/>
           <p:nvPr/>
         </p:nvCxnSpPr>
         <p:spPr>
           <a:xfrm>
-            <a:off x="3954408" y="1538409"/>
-            <a:ext cx="1837184" cy="0"/>
+            <a:off x="5550132" y="3132564"/>
+            <a:ext cx="1492974" cy="0"/>
           </a:xfrm>
           <a:prstGeom prst="straightConnector1">
             <a:avLst/>
@@ -4328,370 +4028,9 @@
             <a:solidFill>
               <a:srgbClr val="0070C0"/>
             </a:solidFill>
-            <a:tailEnd type="arrow"/>
-          </a:ln>
-        </p:spPr>
-        <p:style>
-          <a:lnRef idx="1">
-            <a:schemeClr val="accent1"/>
-          </a:lnRef>
-          <a:fillRef idx="0">
-            <a:schemeClr val="accent1"/>
-          </a:fillRef>
-          <a:effectRef idx="0">
-            <a:schemeClr val="accent1"/>
-          </a:effectRef>
-          <a:fontRef idx="minor">
-            <a:schemeClr val="tx1"/>
-          </a:fontRef>
-        </p:style>
-      </p:cxnSp>
-      <p:sp>
-        <p:nvSpPr>
-          <p:cNvPr id="29" name="TextBox 28"/>
-          <p:cNvSpPr txBox="1"/>
-          <p:nvPr/>
-        </p:nvSpPr>
-        <p:spPr>
-          <a:xfrm>
-            <a:off x="4299772" y="1542583"/>
-            <a:ext cx="1424846" cy="215444"/>
-          </a:xfrm>
-          <a:prstGeom prst="rect">
-            <a:avLst/>
-          </a:prstGeom>
-          <a:noFill/>
-        </p:spPr>
-        <p:txBody>
-          <a:bodyPr wrap="square" lIns="0" tIns="0" rIns="0" bIns="0" rtlCol="0">
-            <a:spAutoFit/>
-          </a:bodyPr>
-          <a:lstStyle/>
-          <a:p>
-            <a:r>
-              <a:rPr lang="en-US" sz="1400" dirty="0" err="1" smtClean="0">
-                <a:solidFill>
-                  <a:srgbClr val="7030A0"/>
-                </a:solidFill>
-              </a:rPr>
-              <a:t>GmapCommand</a:t>
-            </a:r>
-            <a:r>
-              <a:rPr lang="en-US" sz="1400" dirty="0" smtClean="0">
-                <a:solidFill>
-                  <a:srgbClr val="7030A0"/>
-                </a:solidFill>
-              </a:rPr>
-              <a:t>(</a:t>
-            </a:r>
-            <a:r>
-              <a:rPr lang="en-US" sz="1400" dirty="0" err="1" smtClean="0">
-                <a:solidFill>
-                  <a:srgbClr val="7030A0"/>
-                </a:solidFill>
-              </a:rPr>
-              <a:t>i</a:t>
-            </a:r>
-            <a:r>
-              <a:rPr lang="en-US" sz="1400" dirty="0" smtClean="0">
-                <a:solidFill>
-                  <a:srgbClr val="7030A0"/>
-                </a:solidFill>
-              </a:rPr>
-              <a:t>)</a:t>
-            </a:r>
-            <a:endParaRPr lang="en-US" sz="1400" dirty="0">
-              <a:solidFill>
-                <a:srgbClr val="7030A0"/>
-              </a:solidFill>
-            </a:endParaRPr>
-          </a:p>
-        </p:txBody>
-      </p:sp>
-      <p:sp>
-        <p:nvSpPr>
-          <p:cNvPr id="33" name="TextBox 32"/>
-          <p:cNvSpPr txBox="1"/>
-          <p:nvPr/>
-        </p:nvSpPr>
-        <p:spPr>
-          <a:xfrm>
-            <a:off x="6695597" y="1350222"/>
-            <a:ext cx="2438400" cy="215444"/>
-          </a:xfrm>
-          <a:prstGeom prst="rect">
-            <a:avLst/>
-          </a:prstGeom>
-          <a:noFill/>
-        </p:spPr>
-        <p:txBody>
-          <a:bodyPr wrap="square" lIns="0" tIns="0" rIns="0" bIns="0" rtlCol="0">
-            <a:spAutoFit/>
-          </a:bodyPr>
-          <a:lstStyle/>
-          <a:p>
-            <a:r>
-              <a:rPr lang="en-US" sz="1400" dirty="0" smtClean="0">
-                <a:solidFill>
-                  <a:schemeClr val="accent5">
-                    <a:lumMod val="75000"/>
-                  </a:schemeClr>
-                </a:solidFill>
-              </a:rPr>
-              <a:t>raise(</a:t>
-            </a:r>
-            <a:r>
-              <a:rPr lang="en-US" sz="1400" dirty="0" err="1" smtClean="0">
-                <a:solidFill>
-                  <a:schemeClr val="accent5">
-                    <a:lumMod val="75000"/>
-                  </a:schemeClr>
-                </a:solidFill>
-              </a:rPr>
-              <a:t>DisplayGmapEvent</a:t>
-            </a:r>
-            <a:r>
-              <a:rPr lang="en-US" sz="1400" dirty="0" smtClean="0">
-                <a:solidFill>
-                  <a:schemeClr val="accent5">
-                    <a:lumMod val="75000"/>
-                  </a:schemeClr>
-                </a:solidFill>
-              </a:rPr>
-              <a:t>)</a:t>
-            </a:r>
-            <a:endParaRPr lang="en-US" sz="1400" dirty="0">
-              <a:solidFill>
-                <a:schemeClr val="accent5">
-                  <a:lumMod val="75000"/>
-                </a:schemeClr>
-              </a:solidFill>
-            </a:endParaRPr>
-          </a:p>
-        </p:txBody>
-      </p:sp>
-      <p:cxnSp>
-        <p:nvCxnSpPr>
-          <p:cNvPr id="37" name="Straight Arrow Connector 36"/>
-          <p:cNvCxnSpPr/>
-          <p:nvPr/>
-        </p:nvCxnSpPr>
-        <p:spPr>
-          <a:xfrm>
-            <a:off x="314394" y="3048000"/>
-            <a:ext cx="1196051" cy="0"/>
-          </a:xfrm>
-          <a:prstGeom prst="straightConnector1">
-            <a:avLst/>
-          </a:prstGeom>
-          <a:ln w="19050">
-            <a:solidFill>
-              <a:srgbClr val="00B050"/>
-            </a:solidFill>
             <a:prstDash val="sysDash"/>
             <a:headEnd type="arrow" w="med" len="med"/>
             <a:tailEnd type="none" w="med" len="med"/>
-          </a:ln>
-        </p:spPr>
-        <p:style>
-          <a:lnRef idx="1">
-            <a:schemeClr val="accent1"/>
-          </a:lnRef>
-          <a:fillRef idx="0">
-            <a:schemeClr val="accent1"/>
-          </a:fillRef>
-          <a:effectRef idx="0">
-            <a:schemeClr val="accent1"/>
-          </a:effectRef>
-          <a:fontRef idx="minor">
-            <a:schemeClr val="tx1"/>
-          </a:fontRef>
-        </p:style>
-      </p:cxnSp>
-      <p:sp>
-        <p:nvSpPr>
-          <p:cNvPr id="39" name="Rectangle 62"/>
-          <p:cNvSpPr/>
-          <p:nvPr/>
-        </p:nvSpPr>
-        <p:spPr>
-          <a:xfrm>
-            <a:off x="7696200" y="591251"/>
-            <a:ext cx="1371600" cy="346760"/>
-          </a:xfrm>
-          <a:prstGeom prst="rect">
-            <a:avLst/>
-          </a:prstGeom>
-          <a:solidFill>
-            <a:schemeClr val="accent5">
-              <a:lumMod val="75000"/>
-            </a:schemeClr>
-          </a:solidFill>
-          <a:ln w="19050">
-            <a:solidFill>
-              <a:schemeClr val="accent5">
-                <a:lumMod val="75000"/>
-              </a:schemeClr>
-            </a:solidFill>
-          </a:ln>
-          <a:effectLst/>
-        </p:spPr>
-        <p:style>
-          <a:lnRef idx="1">
-            <a:schemeClr val="accent2"/>
-          </a:lnRef>
-          <a:fillRef idx="2">
-            <a:schemeClr val="accent2"/>
-          </a:fillRef>
-          <a:effectRef idx="1">
-            <a:schemeClr val="accent2"/>
-          </a:effectRef>
-          <a:fontRef idx="minor">
-            <a:schemeClr val="dk1"/>
-          </a:fontRef>
-        </p:style>
-        <p:txBody>
-          <a:bodyPr rtlCol="0" anchor="ctr"/>
-          <a:lstStyle/>
-          <a:p>
-            <a:pPr algn="ctr"/>
-            <a:r>
-              <a:rPr lang="en-US" sz="1600" dirty="0" smtClean="0">
-                <a:solidFill>
-                  <a:schemeClr val="bg1"/>
-                </a:solidFill>
-              </a:rPr>
-              <a:t>:</a:t>
-            </a:r>
-            <a:r>
-              <a:rPr lang="en-US" sz="1600" dirty="0" err="1" smtClean="0">
-                <a:solidFill>
-                  <a:schemeClr val="bg1"/>
-                </a:solidFill>
-              </a:rPr>
-              <a:t>EventsCenter</a:t>
-            </a:r>
-            <a:endParaRPr lang="en-SG" sz="1600" dirty="0">
-              <a:solidFill>
-                <a:schemeClr val="bg1"/>
-              </a:solidFill>
-            </a:endParaRPr>
-          </a:p>
-        </p:txBody>
-      </p:sp>
-      <p:cxnSp>
-        <p:nvCxnSpPr>
-          <p:cNvPr id="40" name="Straight Connector 39"/>
-          <p:cNvCxnSpPr/>
-          <p:nvPr/>
-        </p:nvCxnSpPr>
-        <p:spPr>
-          <a:xfrm flipH="1">
-            <a:off x="8610600" y="944305"/>
-            <a:ext cx="6202" cy="2789495"/>
-          </a:xfrm>
-          <a:prstGeom prst="line">
-            <a:avLst/>
-          </a:prstGeom>
-          <a:ln w="19050">
-            <a:solidFill>
-              <a:schemeClr val="accent5">
-                <a:lumMod val="75000"/>
-              </a:schemeClr>
-            </a:solidFill>
-            <a:prstDash val="sysDash"/>
-          </a:ln>
-          <a:effectLst/>
-        </p:spPr>
-        <p:style>
-          <a:lnRef idx="1">
-            <a:schemeClr val="accent1"/>
-          </a:lnRef>
-          <a:fillRef idx="2">
-            <a:schemeClr val="accent1"/>
-          </a:fillRef>
-          <a:effectRef idx="1">
-            <a:schemeClr val="accent1"/>
-          </a:effectRef>
-          <a:fontRef idx="minor">
-            <a:schemeClr val="dk1"/>
-          </a:fontRef>
-        </p:style>
-      </p:cxnSp>
-      <p:sp>
-        <p:nvSpPr>
-          <p:cNvPr id="41" name="Rectangle 40"/>
-          <p:cNvSpPr/>
-          <p:nvPr/>
-        </p:nvSpPr>
-        <p:spPr>
-          <a:xfrm>
-            <a:off x="8512430" y="1650306"/>
-            <a:ext cx="174370" cy="1473894"/>
-          </a:xfrm>
-          <a:prstGeom prst="rect">
-            <a:avLst/>
-          </a:prstGeom>
-          <a:solidFill>
-            <a:schemeClr val="accent5">
-              <a:lumMod val="75000"/>
-            </a:schemeClr>
-          </a:solidFill>
-          <a:ln>
-            <a:solidFill>
-              <a:schemeClr val="accent5">
-                <a:lumMod val="75000"/>
-              </a:schemeClr>
-            </a:solidFill>
-          </a:ln>
-          <a:effectLst/>
-        </p:spPr>
-        <p:style>
-          <a:lnRef idx="1">
-            <a:schemeClr val="accent3"/>
-          </a:lnRef>
-          <a:fillRef idx="2">
-            <a:schemeClr val="accent3"/>
-          </a:fillRef>
-          <a:effectRef idx="1">
-            <a:schemeClr val="accent3"/>
-          </a:effectRef>
-          <a:fontRef idx="minor">
-            <a:schemeClr val="dk1"/>
-          </a:fontRef>
-        </p:style>
-        <p:txBody>
-          <a:bodyPr rtlCol="0" anchor="ctr"/>
-          <a:lstStyle/>
-          <a:p>
-            <a:pPr algn="ctr"/>
-            <a:endParaRPr lang="en-SG" sz="1400">
-              <a:solidFill>
-                <a:schemeClr val="dk1"/>
-              </a:solidFill>
-            </a:endParaRPr>
-          </a:p>
-        </p:txBody>
-      </p:sp>
-      <p:cxnSp>
-        <p:nvCxnSpPr>
-          <p:cNvPr id="42" name="Straight Arrow Connector 41"/>
-          <p:cNvCxnSpPr/>
-          <p:nvPr/>
-        </p:nvCxnSpPr>
-        <p:spPr>
-          <a:xfrm>
-            <a:off x="5943992" y="1650305"/>
-            <a:ext cx="2568438" cy="0"/>
-          </a:xfrm>
-          <a:prstGeom prst="straightConnector1">
-            <a:avLst/>
-          </a:prstGeom>
-          <a:ln w="19050">
-            <a:solidFill>
-              <a:srgbClr val="7030A0"/>
-            </a:solidFill>
-            <a:tailEnd type="arrow"/>
           </a:ln>
         </p:spPr>
         <p:style>
@@ -4711,23 +4050,23 @@
       </p:cxnSp>
       <p:cxnSp>
         <p:nvCxnSpPr>
-          <p:cNvPr id="44" name="Straight Arrow Connector 43"/>
-          <p:cNvCxnSpPr/>
+          <p:cNvPr id="35" name="Straight Arrow Connector 34"/>
+          <p:cNvCxnSpPr>
+            <a:cxnSpLocks/>
+          </p:cNvCxnSpPr>
           <p:nvPr/>
         </p:nvCxnSpPr>
         <p:spPr>
           <a:xfrm>
-            <a:off x="1828800" y="3048000"/>
-            <a:ext cx="6683630" cy="0"/>
+            <a:off x="3132375" y="3387932"/>
+            <a:ext cx="2348067" cy="0"/>
           </a:xfrm>
           <a:prstGeom prst="straightConnector1">
             <a:avLst/>
           </a:prstGeom>
           <a:ln w="19050">
             <a:solidFill>
-              <a:schemeClr val="accent5">
-                <a:lumMod val="75000"/>
-              </a:schemeClr>
+              <a:srgbClr val="0070C0"/>
             </a:solidFill>
             <a:prstDash val="sysDash"/>
             <a:headEnd type="arrow" w="med" len="med"/>
@@ -4751,21 +4090,595 @@
       </p:cxnSp>
       <p:cxnSp>
         <p:nvCxnSpPr>
-          <p:cNvPr id="85" name="Straight Connector 84"/>
+          <p:cNvPr id="37" name="Straight Arrow Connector 36"/>
           <p:cNvCxnSpPr/>
           <p:nvPr/>
         </p:nvCxnSpPr>
         <p:spPr>
-          <a:xfrm flipH="1">
-            <a:off x="300887" y="1099672"/>
-            <a:ext cx="13531" cy="2786528"/>
+          <a:xfrm>
+            <a:off x="1822023" y="5445332"/>
+            <a:ext cx="1196051" cy="0"/>
+          </a:xfrm>
+          <a:prstGeom prst="straightConnector1">
+            <a:avLst/>
+          </a:prstGeom>
+          <a:ln w="19050">
+            <a:solidFill>
+              <a:schemeClr val="accent1"/>
+            </a:solidFill>
+            <a:prstDash val="sysDash"/>
+            <a:headEnd type="arrow" w="med" len="med"/>
+            <a:tailEnd type="none" w="med" len="med"/>
+          </a:ln>
+        </p:spPr>
+        <p:style>
+          <a:lnRef idx="1">
+            <a:schemeClr val="accent1"/>
+          </a:lnRef>
+          <a:fillRef idx="0">
+            <a:schemeClr val="accent1"/>
+          </a:fillRef>
+          <a:effectRef idx="0">
+            <a:schemeClr val="accent1"/>
+          </a:effectRef>
+          <a:fontRef idx="minor">
+            <a:schemeClr val="tx1"/>
+          </a:fontRef>
+        </p:style>
+      </p:cxnSp>
+      <p:sp>
+        <p:nvSpPr>
+          <p:cNvPr id="65" name="Rectangle 64"/>
+          <p:cNvSpPr/>
+          <p:nvPr/>
+        </p:nvSpPr>
+        <p:spPr>
+          <a:xfrm>
+            <a:off x="6967512" y="3985645"/>
+            <a:ext cx="161322" cy="1307285"/>
+          </a:xfrm>
+          <a:prstGeom prst="rect">
+            <a:avLst/>
+          </a:prstGeom>
+          <a:solidFill>
+            <a:srgbClr val="0070C0"/>
+          </a:solidFill>
+          <a:ln>
+            <a:solidFill>
+              <a:srgbClr val="0070C0"/>
+            </a:solidFill>
+          </a:ln>
+          <a:effectLst/>
+        </p:spPr>
+        <p:style>
+          <a:lnRef idx="1">
+            <a:schemeClr val="accent3"/>
+          </a:lnRef>
+          <a:fillRef idx="2">
+            <a:schemeClr val="accent3"/>
+          </a:fillRef>
+          <a:effectRef idx="1">
+            <a:schemeClr val="accent3"/>
+          </a:effectRef>
+          <a:fontRef idx="minor">
+            <a:schemeClr val="dk1"/>
+          </a:fontRef>
+        </p:style>
+        <p:txBody>
+          <a:bodyPr rtlCol="0" anchor="ctr"/>
+          <a:lstStyle/>
+          <a:p>
+            <a:pPr algn="ctr"/>
+            <a:endParaRPr lang="en-SG" sz="1400"/>
+          </a:p>
+        </p:txBody>
+      </p:sp>
+      <p:sp>
+        <p:nvSpPr>
+          <p:cNvPr id="80" name="TextBox 79"/>
+          <p:cNvSpPr txBox="1"/>
+          <p:nvPr/>
+        </p:nvSpPr>
+        <p:spPr>
+          <a:xfrm>
+            <a:off x="3326213" y="2360482"/>
+            <a:ext cx="2079760" cy="215444"/>
+          </a:xfrm>
+          <a:prstGeom prst="rect">
+            <a:avLst/>
+          </a:prstGeom>
+          <a:noFill/>
+        </p:spPr>
+        <p:txBody>
+          <a:bodyPr wrap="square" lIns="0" tIns="0" rIns="0" bIns="0" rtlCol="0">
+            <a:spAutoFit/>
+          </a:bodyPr>
+          <a:lstStyle>
+            <a:defPPr>
+              <a:defRPr lang="en-US"/>
+            </a:defPPr>
+            <a:lvl1pPr algn="r">
+              <a:defRPr sz="1400">
+                <a:solidFill>
+                  <a:srgbClr val="0070C0"/>
+                </a:solidFill>
+              </a:defRPr>
+            </a:lvl1pPr>
+          </a:lstStyle>
+          <a:p>
+            <a:r>
+              <a:rPr lang="en-US" dirty="0" err="1"/>
+              <a:t>parseCommand</a:t>
+            </a:r>
+            <a:r>
+              <a:rPr lang="en-US" dirty="0"/>
+              <a:t>(“</a:t>
+            </a:r>
+            <a:r>
+              <a:rPr lang="en-US" dirty="0" err="1"/>
+              <a:t>gmap</a:t>
+            </a:r>
+            <a:r>
+              <a:rPr lang="en-US" dirty="0"/>
+              <a:t> 1”)</a:t>
+            </a:r>
+          </a:p>
+        </p:txBody>
+      </p:sp>
+      <p:sp>
+        <p:nvSpPr>
+          <p:cNvPr id="82" name="TextBox 81"/>
+          <p:cNvSpPr txBox="1"/>
+          <p:nvPr/>
+        </p:nvSpPr>
+        <p:spPr>
+          <a:xfrm>
+            <a:off x="4713779" y="5045408"/>
+            <a:ext cx="621216" cy="215444"/>
+          </a:xfrm>
+          <a:prstGeom prst="rect">
+            <a:avLst/>
+          </a:prstGeom>
+          <a:noFill/>
+        </p:spPr>
+        <p:txBody>
+          <a:bodyPr wrap="square" lIns="0" tIns="0" rIns="0" bIns="0" rtlCol="0">
+            <a:spAutoFit/>
+          </a:bodyPr>
+          <a:lstStyle>
+            <a:defPPr>
+              <a:defRPr lang="en-US"/>
+            </a:defPPr>
+            <a:lvl1pPr algn="r">
+              <a:defRPr sz="1400">
+                <a:solidFill>
+                  <a:srgbClr val="0070C0"/>
+                </a:solidFill>
+              </a:defRPr>
+            </a:lvl1pPr>
+          </a:lstStyle>
+          <a:p>
+            <a:r>
+              <a:rPr lang="en-US" dirty="0"/>
+              <a:t>result</a:t>
+            </a:r>
+          </a:p>
+        </p:txBody>
+      </p:sp>
+      <p:sp>
+        <p:nvSpPr>
+          <p:cNvPr id="83" name="TextBox 82"/>
+          <p:cNvSpPr txBox="1"/>
+          <p:nvPr/>
+        </p:nvSpPr>
+        <p:spPr>
+          <a:xfrm>
+            <a:off x="2086294" y="5200233"/>
+            <a:ext cx="762000" cy="215444"/>
+          </a:xfrm>
+          <a:prstGeom prst="rect">
+            <a:avLst/>
+          </a:prstGeom>
+          <a:noFill/>
+        </p:spPr>
+        <p:txBody>
+          <a:bodyPr wrap="square" lIns="0" tIns="0" rIns="0" bIns="0" rtlCol="0">
+            <a:spAutoFit/>
+          </a:bodyPr>
+          <a:lstStyle>
+            <a:defPPr>
+              <a:defRPr lang="en-US"/>
+            </a:defPPr>
+            <a:lvl1pPr algn="r">
+              <a:defRPr sz="1400">
+                <a:solidFill>
+                  <a:srgbClr val="0070C0"/>
+                </a:solidFill>
+              </a:defRPr>
+            </a:lvl1pPr>
+          </a:lstStyle>
+          <a:p>
+            <a:r>
+              <a:rPr lang="en-US" dirty="0"/>
+              <a:t>result</a:t>
+            </a:r>
+          </a:p>
+        </p:txBody>
+      </p:sp>
+      <p:sp>
+        <p:nvSpPr>
+          <p:cNvPr id="93" name="TextBox 92"/>
+          <p:cNvSpPr txBox="1"/>
+          <p:nvPr/>
+        </p:nvSpPr>
+        <p:spPr>
+          <a:xfrm>
+            <a:off x="4165816" y="3160125"/>
+            <a:ext cx="220343" cy="215444"/>
+          </a:xfrm>
+          <a:prstGeom prst="rect">
+            <a:avLst/>
+          </a:prstGeom>
+          <a:noFill/>
+        </p:spPr>
+        <p:txBody>
+          <a:bodyPr wrap="square" lIns="0" tIns="0" rIns="0" bIns="0" rtlCol="0">
+            <a:spAutoFit/>
+          </a:bodyPr>
+          <a:lstStyle>
+            <a:defPPr>
+              <a:defRPr lang="en-US"/>
+            </a:defPPr>
+            <a:lvl1pPr algn="r">
+              <a:defRPr sz="1400">
+                <a:solidFill>
+                  <a:srgbClr val="0070C0"/>
+                </a:solidFill>
+              </a:defRPr>
+            </a:lvl1pPr>
+          </a:lstStyle>
+          <a:p>
+            <a:r>
+              <a:rPr lang="en-US" dirty="0"/>
+              <a:t>u</a:t>
+            </a:r>
+          </a:p>
+        </p:txBody>
+      </p:sp>
+      <p:sp>
+        <p:nvSpPr>
+          <p:cNvPr id="19" name="Rectangle 62"/>
+          <p:cNvSpPr/>
+          <p:nvPr/>
+        </p:nvSpPr>
+        <p:spPr>
+          <a:xfrm>
+            <a:off x="6477000" y="2514600"/>
+            <a:ext cx="1093635" cy="461538"/>
+          </a:xfrm>
+          <a:prstGeom prst="rect">
+            <a:avLst/>
+          </a:prstGeom>
+          <a:solidFill>
+            <a:srgbClr val="0070C0"/>
+          </a:solidFill>
+          <a:ln w="19050">
+            <a:solidFill>
+              <a:srgbClr val="0070C0"/>
+            </a:solidFill>
+          </a:ln>
+          <a:effectLst/>
+        </p:spPr>
+        <p:style>
+          <a:lnRef idx="1">
+            <a:schemeClr val="accent2"/>
+          </a:lnRef>
+          <a:fillRef idx="2">
+            <a:schemeClr val="accent2"/>
+          </a:fillRef>
+          <a:effectRef idx="1">
+            <a:schemeClr val="accent2"/>
+          </a:effectRef>
+          <a:fontRef idx="minor">
+            <a:schemeClr val="dk1"/>
+          </a:fontRef>
+        </p:style>
+        <p:txBody>
+          <a:bodyPr rtlCol="0" anchor="ctr"/>
+          <a:lstStyle/>
+          <a:p>
+            <a:pPr algn="ctr"/>
+            <a:r>
+              <a:rPr lang="en-US" sz="1600" dirty="0">
+                <a:solidFill>
+                  <a:schemeClr val="bg1"/>
+                </a:solidFill>
+              </a:rPr>
+              <a:t>g:Gmap</a:t>
+            </a:r>
+          </a:p>
+          <a:p>
+            <a:pPr algn="ctr"/>
+            <a:r>
+              <a:rPr lang="en-US" sz="1600" dirty="0">
+                <a:solidFill>
+                  <a:schemeClr val="bg1"/>
+                </a:solidFill>
+              </a:rPr>
+              <a:t>Command</a:t>
+            </a:r>
+            <a:endParaRPr lang="en-SG" sz="1600" dirty="0">
+              <a:solidFill>
+                <a:schemeClr val="bg1"/>
+              </a:solidFill>
+            </a:endParaRPr>
+          </a:p>
+        </p:txBody>
+      </p:sp>
+      <p:cxnSp>
+        <p:nvCxnSpPr>
+          <p:cNvPr id="66" name="Straight Arrow Connector 65">
+            <a:extLst>
+              <a:ext uri="{FF2B5EF4-FFF2-40B4-BE49-F238E27FC236}">
+                <a16:creationId xmlns:a16="http://schemas.microsoft.com/office/drawing/2014/main" id="{39916E2E-195A-4DC8-B025-B05FA87E6796}"/>
+              </a:ext>
+            </a:extLst>
+          </p:cNvPr>
+          <p:cNvCxnSpPr>
+            <a:cxnSpLocks/>
+          </p:cNvCxnSpPr>
+          <p:nvPr/>
+        </p:nvCxnSpPr>
+        <p:spPr>
+          <a:xfrm>
+            <a:off x="3132375" y="3985646"/>
+            <a:ext cx="3832164" cy="1"/>
+          </a:xfrm>
+          <a:prstGeom prst="straightConnector1">
+            <a:avLst/>
+          </a:prstGeom>
+          <a:ln w="19050">
+            <a:solidFill>
+              <a:srgbClr val="0070C0"/>
+            </a:solidFill>
+            <a:tailEnd type="arrow"/>
+          </a:ln>
+        </p:spPr>
+        <p:style>
+          <a:lnRef idx="1">
+            <a:schemeClr val="accent1"/>
+          </a:lnRef>
+          <a:fillRef idx="0">
+            <a:schemeClr val="accent1"/>
+          </a:fillRef>
+          <a:effectRef idx="0">
+            <a:schemeClr val="accent1"/>
+          </a:effectRef>
+          <a:fontRef idx="minor">
+            <a:schemeClr val="tx1"/>
+          </a:fontRef>
+        </p:style>
+      </p:cxnSp>
+      <p:cxnSp>
+        <p:nvCxnSpPr>
+          <p:cNvPr id="67" name="Straight Arrow Connector 66">
+            <a:extLst>
+              <a:ext uri="{FF2B5EF4-FFF2-40B4-BE49-F238E27FC236}">
+                <a16:creationId xmlns:a16="http://schemas.microsoft.com/office/drawing/2014/main" id="{D881596E-177C-4FDC-8E60-CAB90B3D5FAB}"/>
+              </a:ext>
+            </a:extLst>
+          </p:cNvPr>
+          <p:cNvCxnSpPr>
+            <a:cxnSpLocks/>
+          </p:cNvCxnSpPr>
+          <p:nvPr/>
+        </p:nvCxnSpPr>
+        <p:spPr>
+          <a:xfrm>
+            <a:off x="3149269" y="2618250"/>
+            <a:ext cx="2256705" cy="1"/>
+          </a:xfrm>
+          <a:prstGeom prst="straightConnector1">
+            <a:avLst/>
+          </a:prstGeom>
+          <a:ln w="19050">
+            <a:solidFill>
+              <a:srgbClr val="0070C0"/>
+            </a:solidFill>
+            <a:tailEnd type="arrow"/>
+          </a:ln>
+        </p:spPr>
+        <p:style>
+          <a:lnRef idx="1">
+            <a:schemeClr val="accent1"/>
+          </a:lnRef>
+          <a:fillRef idx="0">
+            <a:schemeClr val="accent1"/>
+          </a:fillRef>
+          <a:effectRef idx="0">
+            <a:schemeClr val="accent1"/>
+          </a:effectRef>
+          <a:fontRef idx="minor">
+            <a:schemeClr val="tx1"/>
+          </a:fontRef>
+        </p:style>
+      </p:cxnSp>
+      <p:cxnSp>
+        <p:nvCxnSpPr>
+          <p:cNvPr id="69" name="Straight Arrow Connector 68">
+            <a:extLst>
+              <a:ext uri="{FF2B5EF4-FFF2-40B4-BE49-F238E27FC236}">
+                <a16:creationId xmlns:a16="http://schemas.microsoft.com/office/drawing/2014/main" id="{7C9F21BC-13A9-471F-825A-2621FD36355F}"/>
+              </a:ext>
+            </a:extLst>
+          </p:cNvPr>
+          <p:cNvCxnSpPr>
+            <a:cxnSpLocks/>
+          </p:cNvCxnSpPr>
+          <p:nvPr/>
+        </p:nvCxnSpPr>
+        <p:spPr>
+          <a:xfrm>
+            <a:off x="3133022" y="5290794"/>
+            <a:ext cx="3831517" cy="0"/>
+          </a:xfrm>
+          <a:prstGeom prst="straightConnector1">
+            <a:avLst/>
+          </a:prstGeom>
+          <a:ln w="19050">
+            <a:solidFill>
+              <a:srgbClr val="0070C0"/>
+            </a:solidFill>
+            <a:prstDash val="sysDash"/>
+            <a:headEnd type="arrow" w="med" len="med"/>
+            <a:tailEnd type="none" w="med" len="med"/>
+          </a:ln>
+        </p:spPr>
+        <p:style>
+          <a:lnRef idx="1">
+            <a:schemeClr val="accent1"/>
+          </a:lnRef>
+          <a:fillRef idx="0">
+            <a:schemeClr val="accent1"/>
+          </a:fillRef>
+          <a:effectRef idx="0">
+            <a:schemeClr val="accent1"/>
+          </a:effectRef>
+          <a:fontRef idx="minor">
+            <a:schemeClr val="tx1"/>
+          </a:fontRef>
+        </p:style>
+      </p:cxnSp>
+    </p:spTree>
+    <p:extLst>
+      <p:ext uri="{BB962C8B-B14F-4D97-AF65-F5344CB8AC3E}">
+        <p14:creationId xmlns:p14="http://schemas.microsoft.com/office/powerpoint/2010/main" val="3068410720"/>
+      </p:ext>
+    </p:extLst>
+  </p:cSld>
+  <p:clrMapOvr>
+    <a:masterClrMapping/>
+  </p:clrMapOvr>
+</p:sld>
+</file>
+
+<file path=ppt/slides/slide2.xml><?xml version="1.0" encoding="utf-8"?>
+<p:sld xmlns:a="http://schemas.openxmlformats.org/drawingml/2006/main" xmlns:r="http://schemas.openxmlformats.org/officeDocument/2006/relationships" xmlns:p="http://schemas.openxmlformats.org/presentationml/2006/main">
+  <p:cSld>
+    <p:spTree>
+      <p:nvGrpSpPr>
+        <p:cNvPr id="1" name=""/>
+        <p:cNvGrpSpPr/>
+        <p:nvPr/>
+      </p:nvGrpSpPr>
+      <p:grpSpPr>
+        <a:xfrm>
+          <a:off x="0" y="0"/>
+          <a:ext cx="0" cy="0"/>
+          <a:chOff x="0" y="0"/>
+          <a:chExt cx="0" cy="0"/>
+        </a:xfrm>
+      </p:grpSpPr>
+      <p:sp>
+        <p:nvSpPr>
+          <p:cNvPr id="2" name="Rectangle 62"/>
+          <p:cNvSpPr/>
+          <p:nvPr/>
+        </p:nvSpPr>
+        <p:spPr>
+          <a:xfrm>
+            <a:off x="875828" y="2090917"/>
+            <a:ext cx="1424846" cy="552389"/>
+          </a:xfrm>
+          <a:prstGeom prst="rect">
+            <a:avLst/>
+          </a:prstGeom>
+          <a:solidFill>
+            <a:srgbClr val="0070C0"/>
+          </a:solidFill>
+          <a:ln w="19050">
+            <a:solidFill>
+              <a:srgbClr val="0070C0"/>
+            </a:solidFill>
+          </a:ln>
+          <a:effectLst/>
+        </p:spPr>
+        <p:style>
+          <a:lnRef idx="1">
+            <a:schemeClr val="accent2"/>
+          </a:lnRef>
+          <a:fillRef idx="2">
+            <a:schemeClr val="accent2"/>
+          </a:fillRef>
+          <a:effectRef idx="1">
+            <a:schemeClr val="accent2"/>
+          </a:effectRef>
+          <a:fontRef idx="minor">
+            <a:schemeClr val="dk1"/>
+          </a:fontRef>
+        </p:style>
+        <p:txBody>
+          <a:bodyPr rtlCol="0" anchor="ctr"/>
+          <a:lstStyle/>
+          <a:p>
+            <a:pPr algn="ctr"/>
+            <a:r>
+              <a:rPr lang="en-US" sz="1600" dirty="0">
+                <a:solidFill>
+                  <a:schemeClr val="bg1"/>
+                </a:solidFill>
+              </a:rPr>
+              <a:t>:</a:t>
+            </a:r>
+            <a:r>
+              <a:rPr lang="en-US" sz="1600" dirty="0" err="1">
+                <a:solidFill>
+                  <a:schemeClr val="bg1"/>
+                </a:solidFill>
+              </a:rPr>
+              <a:t>Gmap</a:t>
+            </a:r>
+            <a:endParaRPr lang="en-US" sz="1600" dirty="0">
+              <a:solidFill>
+                <a:schemeClr val="bg1"/>
+              </a:solidFill>
+            </a:endParaRPr>
+          </a:p>
+          <a:p>
+            <a:pPr algn="ctr"/>
+            <a:r>
+              <a:rPr lang="en-US" sz="1600" dirty="0">
+                <a:solidFill>
+                  <a:schemeClr val="bg1"/>
+                </a:solidFill>
+              </a:rPr>
+              <a:t>Command</a:t>
+            </a:r>
+            <a:endParaRPr lang="en-SG" sz="1600" dirty="0">
+              <a:solidFill>
+                <a:schemeClr val="bg1"/>
+              </a:solidFill>
+            </a:endParaRPr>
+          </a:p>
+        </p:txBody>
+      </p:sp>
+      <p:cxnSp>
+        <p:nvCxnSpPr>
+          <p:cNvPr id="5" name="Straight Connector 4"/>
+          <p:cNvCxnSpPr/>
+          <p:nvPr/>
+        </p:nvCxnSpPr>
+        <p:spPr>
+          <a:xfrm>
+            <a:off x="1572859" y="2660217"/>
+            <a:ext cx="0" cy="2597583"/>
           </a:xfrm>
           <a:prstGeom prst="line">
             <a:avLst/>
           </a:prstGeom>
           <a:ln w="19050">
             <a:solidFill>
-              <a:schemeClr val="tx1"/>
+              <a:srgbClr val="0070C0"/>
             </a:solidFill>
             <a:prstDash val="sysDash"/>
           </a:ln>
@@ -4788,14 +4701,61 @@
       </p:cxnSp>
       <p:sp>
         <p:nvSpPr>
-          <p:cNvPr id="71" name="TextBox 70"/>
+          <p:cNvPr id="6" name="Rectangle 5"/>
+          <p:cNvSpPr/>
+          <p:nvPr/>
+        </p:nvSpPr>
+        <p:spPr>
+          <a:xfrm>
+            <a:off x="1500851" y="3010911"/>
+            <a:ext cx="152400" cy="2780287"/>
+          </a:xfrm>
+          <a:prstGeom prst="rect">
+            <a:avLst/>
+          </a:prstGeom>
+          <a:solidFill>
+            <a:srgbClr val="0070C0"/>
+          </a:solidFill>
+          <a:ln>
+            <a:solidFill>
+              <a:srgbClr val="0070C0"/>
+            </a:solidFill>
+          </a:ln>
+          <a:effectLst/>
+        </p:spPr>
+        <p:style>
+          <a:lnRef idx="1">
+            <a:schemeClr val="accent3"/>
+          </a:lnRef>
+          <a:fillRef idx="2">
+            <a:schemeClr val="accent3"/>
+          </a:fillRef>
+          <a:effectRef idx="1">
+            <a:schemeClr val="accent3"/>
+          </a:effectRef>
+          <a:fontRef idx="minor">
+            <a:schemeClr val="dk1"/>
+          </a:fontRef>
+        </p:style>
+        <p:txBody>
+          <a:bodyPr rtlCol="0" anchor="ctr"/>
+          <a:lstStyle/>
+          <a:p>
+            <a:pPr algn="ctr"/>
+            <a:endParaRPr lang="en-SG" sz="1400"/>
+          </a:p>
+        </p:txBody>
+      </p:sp>
+      <p:sp>
+        <p:nvSpPr>
+          <p:cNvPr id="26" name="TextBox 25"/>
           <p:cNvSpPr txBox="1"/>
           <p:nvPr/>
         </p:nvSpPr>
         <p:spPr>
           <a:xfrm>
-            <a:off x="1985868" y="3129972"/>
-            <a:ext cx="2438400" cy="215444"/>
+            <a:off x="-160126" y="2795467"/>
+            <a:ext cx="1424846" cy="215444"/>
           </a:xfrm>
           <a:prstGeom prst="rect">
             <a:avLst/>
@@ -4808,16 +4768,1611 @@
           </a:bodyPr>
           <a:lstStyle/>
           <a:p>
-            <a:r>
-              <a:rPr lang="en-US" sz="1400" dirty="0" smtClean="0">
+            <a:pPr algn="r"/>
+            <a:r>
+              <a:rPr lang="en-US" sz="1400" dirty="0">
+                <a:solidFill>
+                  <a:srgbClr val="0070C0"/>
+                </a:solidFill>
+              </a:rPr>
+              <a:t>execute()</a:t>
+            </a:r>
+          </a:p>
+        </p:txBody>
+      </p:sp>
+      <p:cxnSp>
+        <p:nvCxnSpPr>
+          <p:cNvPr id="37" name="Straight Arrow Connector 36"/>
+          <p:cNvCxnSpPr/>
+          <p:nvPr/>
+        </p:nvCxnSpPr>
+        <p:spPr>
+          <a:xfrm>
+            <a:off x="304800" y="5791200"/>
+            <a:ext cx="1196051" cy="0"/>
+          </a:xfrm>
+          <a:prstGeom prst="straightConnector1">
+            <a:avLst/>
+          </a:prstGeom>
+          <a:ln w="19050">
+            <a:solidFill>
+              <a:schemeClr val="accent1"/>
+            </a:solidFill>
+            <a:prstDash val="sysDash"/>
+            <a:headEnd type="arrow" w="med" len="med"/>
+            <a:tailEnd type="none" w="med" len="med"/>
+          </a:ln>
+        </p:spPr>
+        <p:style>
+          <a:lnRef idx="1">
+            <a:schemeClr val="accent1"/>
+          </a:lnRef>
+          <a:fillRef idx="0">
+            <a:schemeClr val="accent1"/>
+          </a:fillRef>
+          <a:effectRef idx="0">
+            <a:schemeClr val="accent1"/>
+          </a:effectRef>
+          <a:fontRef idx="minor">
+            <a:schemeClr val="tx1"/>
+          </a:fontRef>
+        </p:style>
+      </p:cxnSp>
+      <p:sp>
+        <p:nvSpPr>
+          <p:cNvPr id="83" name="TextBox 82"/>
+          <p:cNvSpPr txBox="1"/>
+          <p:nvPr/>
+        </p:nvSpPr>
+        <p:spPr>
+          <a:xfrm>
+            <a:off x="599983" y="5538488"/>
+            <a:ext cx="762000" cy="215444"/>
+          </a:xfrm>
+          <a:prstGeom prst="rect">
+            <a:avLst/>
+          </a:prstGeom>
+          <a:noFill/>
+        </p:spPr>
+        <p:txBody>
+          <a:bodyPr wrap="square" lIns="0" tIns="0" rIns="0" bIns="0" rtlCol="0">
+            <a:spAutoFit/>
+          </a:bodyPr>
+          <a:lstStyle>
+            <a:defPPr>
+              <a:defRPr lang="en-US"/>
+            </a:defPPr>
+            <a:lvl1pPr algn="r">
+              <a:defRPr sz="1400">
+                <a:solidFill>
+                  <a:srgbClr val="0070C0"/>
+                </a:solidFill>
+              </a:defRPr>
+            </a:lvl1pPr>
+          </a:lstStyle>
+          <a:p>
+            <a:r>
+              <a:rPr lang="en-US" dirty="0"/>
+              <a:t>result</a:t>
+            </a:r>
+          </a:p>
+        </p:txBody>
+      </p:sp>
+      <p:cxnSp>
+        <p:nvCxnSpPr>
+          <p:cNvPr id="48" name="Straight Arrow Connector 47">
+            <a:extLst>
+              <a:ext uri="{FF2B5EF4-FFF2-40B4-BE49-F238E27FC236}">
+                <a16:creationId xmlns:a16="http://schemas.microsoft.com/office/drawing/2014/main" id="{D17B4D3B-62A5-476F-BBEB-649ED254ED81}"/>
+              </a:ext>
+            </a:extLst>
+          </p:cNvPr>
+          <p:cNvCxnSpPr>
+            <a:cxnSpLocks/>
+          </p:cNvCxnSpPr>
+          <p:nvPr/>
+        </p:nvCxnSpPr>
+        <p:spPr>
+          <a:xfrm>
+            <a:off x="387591" y="3068630"/>
+            <a:ext cx="1089847" cy="9302"/>
+          </a:xfrm>
+          <a:prstGeom prst="straightConnector1">
+            <a:avLst/>
+          </a:prstGeom>
+          <a:ln w="19050">
+            <a:solidFill>
+              <a:srgbClr val="0070C0"/>
+            </a:solidFill>
+            <a:tailEnd type="arrow"/>
+          </a:ln>
+        </p:spPr>
+        <p:style>
+          <a:lnRef idx="1">
+            <a:schemeClr val="accent1"/>
+          </a:lnRef>
+          <a:fillRef idx="0">
+            <a:schemeClr val="accent1"/>
+          </a:fillRef>
+          <a:effectRef idx="0">
+            <a:schemeClr val="accent1"/>
+          </a:effectRef>
+          <a:fontRef idx="minor">
+            <a:schemeClr val="tx1"/>
+          </a:fontRef>
+        </p:style>
+      </p:cxnSp>
+      <p:sp>
+        <p:nvSpPr>
+          <p:cNvPr id="53" name="Rectangle 62">
+            <a:extLst>
+              <a:ext uri="{FF2B5EF4-FFF2-40B4-BE49-F238E27FC236}">
+                <a16:creationId xmlns:a16="http://schemas.microsoft.com/office/drawing/2014/main" id="{7F026634-FA67-425E-ADBF-9FC6F7D9F2DF}"/>
+              </a:ext>
+            </a:extLst>
+          </p:cNvPr>
+          <p:cNvSpPr/>
+          <p:nvPr/>
+        </p:nvSpPr>
+        <p:spPr>
+          <a:xfrm>
+            <a:off x="6223803" y="2209800"/>
+            <a:ext cx="1424845" cy="433506"/>
+          </a:xfrm>
+          <a:prstGeom prst="rect">
+            <a:avLst/>
+          </a:prstGeom>
+          <a:solidFill>
+            <a:srgbClr val="00B050"/>
+          </a:solidFill>
+          <a:ln w="19050">
+            <a:solidFill>
+              <a:srgbClr val="00B050"/>
+            </a:solidFill>
+          </a:ln>
+          <a:effectLst/>
+        </p:spPr>
+        <p:style>
+          <a:lnRef idx="1">
+            <a:schemeClr val="accent2"/>
+          </a:lnRef>
+          <a:fillRef idx="2">
+            <a:schemeClr val="accent2"/>
+          </a:fillRef>
+          <a:effectRef idx="1">
+            <a:schemeClr val="accent2"/>
+          </a:effectRef>
+          <a:fontRef idx="minor">
+            <a:schemeClr val="dk1"/>
+          </a:fontRef>
+        </p:style>
+        <p:txBody>
+          <a:bodyPr rtlCol="0" anchor="ctr"/>
+          <a:lstStyle/>
+          <a:p>
+            <a:pPr algn="ctr"/>
+            <a:r>
+              <a:rPr lang="en-US" sz="1600" dirty="0">
+                <a:solidFill>
+                  <a:schemeClr val="bg1"/>
+                </a:solidFill>
+              </a:rPr>
+              <a:t>:</a:t>
+            </a:r>
+            <a:r>
+              <a:rPr lang="en-US" sz="1600" dirty="0" err="1">
+                <a:solidFill>
+                  <a:schemeClr val="bg1"/>
+                </a:solidFill>
+              </a:rPr>
+              <a:t>BrowserPanel</a:t>
+            </a:r>
+            <a:endParaRPr lang="en-SG" sz="1600" dirty="0">
+              <a:solidFill>
+                <a:schemeClr val="bg1"/>
+              </a:solidFill>
+            </a:endParaRPr>
+          </a:p>
+        </p:txBody>
+      </p:sp>
+      <p:cxnSp>
+        <p:nvCxnSpPr>
+          <p:cNvPr id="54" name="Straight Connector 53">
+            <a:extLst>
+              <a:ext uri="{FF2B5EF4-FFF2-40B4-BE49-F238E27FC236}">
+                <a16:creationId xmlns:a16="http://schemas.microsoft.com/office/drawing/2014/main" id="{F1153510-0152-4F4F-9223-D9F8F5F783F0}"/>
+              </a:ext>
+            </a:extLst>
+          </p:cNvPr>
+          <p:cNvCxnSpPr>
+            <a:cxnSpLocks/>
+            <a:stCxn id="53" idx="2"/>
+          </p:cNvCxnSpPr>
+          <p:nvPr/>
+        </p:nvCxnSpPr>
+        <p:spPr>
+          <a:xfrm flipH="1">
+            <a:off x="6936224" y="2643306"/>
+            <a:ext cx="2" cy="2934486"/>
+          </a:xfrm>
+          <a:prstGeom prst="line">
+            <a:avLst/>
+          </a:prstGeom>
+          <a:ln w="19050">
+            <a:solidFill>
+              <a:srgbClr val="00B050"/>
+            </a:solidFill>
+            <a:prstDash val="sysDash"/>
+          </a:ln>
+          <a:effectLst/>
+        </p:spPr>
+        <p:style>
+          <a:lnRef idx="1">
+            <a:schemeClr val="accent1"/>
+          </a:lnRef>
+          <a:fillRef idx="2">
+            <a:schemeClr val="accent1"/>
+          </a:fillRef>
+          <a:effectRef idx="1">
+            <a:schemeClr val="accent1"/>
+          </a:effectRef>
+          <a:fontRef idx="minor">
+            <a:schemeClr val="dk1"/>
+          </a:fontRef>
+        </p:style>
+      </p:cxnSp>
+      <p:sp>
+        <p:nvSpPr>
+          <p:cNvPr id="55" name="Rectangle 54">
+            <a:extLst>
+              <a:ext uri="{FF2B5EF4-FFF2-40B4-BE49-F238E27FC236}">
+                <a16:creationId xmlns:a16="http://schemas.microsoft.com/office/drawing/2014/main" id="{FB6A1251-F187-4CD9-A09E-67763A30BB9F}"/>
+              </a:ext>
+            </a:extLst>
+          </p:cNvPr>
+          <p:cNvSpPr/>
+          <p:nvPr/>
+        </p:nvSpPr>
+        <p:spPr>
+          <a:xfrm>
+            <a:off x="6836946" y="3498940"/>
+            <a:ext cx="198555" cy="794359"/>
+          </a:xfrm>
+          <a:prstGeom prst="rect">
+            <a:avLst/>
+          </a:prstGeom>
+          <a:solidFill>
+            <a:srgbClr val="00B050"/>
+          </a:solidFill>
+          <a:ln>
+            <a:solidFill>
+              <a:srgbClr val="00B050"/>
+            </a:solidFill>
+          </a:ln>
+          <a:effectLst/>
+        </p:spPr>
+        <p:style>
+          <a:lnRef idx="1">
+            <a:schemeClr val="accent3"/>
+          </a:lnRef>
+          <a:fillRef idx="2">
+            <a:schemeClr val="accent3"/>
+          </a:fillRef>
+          <a:effectRef idx="1">
+            <a:schemeClr val="accent3"/>
+          </a:effectRef>
+          <a:fontRef idx="minor">
+            <a:schemeClr val="dk1"/>
+          </a:fontRef>
+        </p:style>
+        <p:txBody>
+          <a:bodyPr rtlCol="0" anchor="ctr"/>
+          <a:lstStyle/>
+          <a:p>
+            <a:pPr algn="ctr"/>
+            <a:endParaRPr lang="en-SG" sz="1400">
+              <a:solidFill>
+                <a:schemeClr val="dk1"/>
+              </a:solidFill>
+            </a:endParaRPr>
+          </a:p>
+        </p:txBody>
+      </p:sp>
+      <p:sp>
+        <p:nvSpPr>
+          <p:cNvPr id="56" name="Rectangle 62">
+            <a:extLst>
+              <a:ext uri="{FF2B5EF4-FFF2-40B4-BE49-F238E27FC236}">
+                <a16:creationId xmlns:a16="http://schemas.microsoft.com/office/drawing/2014/main" id="{868FFC14-D7B8-477B-BA73-0E6F9D7C6556}"/>
+              </a:ext>
+            </a:extLst>
+          </p:cNvPr>
+          <p:cNvSpPr/>
+          <p:nvPr/>
+        </p:nvSpPr>
+        <p:spPr>
+          <a:xfrm>
+            <a:off x="3429154" y="2170496"/>
+            <a:ext cx="1371600" cy="433506"/>
+          </a:xfrm>
+          <a:prstGeom prst="rect">
+            <a:avLst/>
+          </a:prstGeom>
+          <a:solidFill>
+            <a:schemeClr val="accent5">
+              <a:lumMod val="75000"/>
+            </a:schemeClr>
+          </a:solidFill>
+          <a:ln w="19050">
+            <a:solidFill>
+              <a:schemeClr val="accent5">
+                <a:lumMod val="75000"/>
+              </a:schemeClr>
+            </a:solidFill>
+          </a:ln>
+          <a:effectLst/>
+        </p:spPr>
+        <p:style>
+          <a:lnRef idx="1">
+            <a:schemeClr val="accent2"/>
+          </a:lnRef>
+          <a:fillRef idx="2">
+            <a:schemeClr val="accent2"/>
+          </a:fillRef>
+          <a:effectRef idx="1">
+            <a:schemeClr val="accent2"/>
+          </a:effectRef>
+          <a:fontRef idx="minor">
+            <a:schemeClr val="dk1"/>
+          </a:fontRef>
+        </p:style>
+        <p:txBody>
+          <a:bodyPr rtlCol="0" anchor="ctr"/>
+          <a:lstStyle/>
+          <a:p>
+            <a:pPr algn="ctr"/>
+            <a:r>
+              <a:rPr lang="en-US" sz="1600" dirty="0">
+                <a:solidFill>
+                  <a:schemeClr val="bg1"/>
+                </a:solidFill>
+              </a:rPr>
+              <a:t>:</a:t>
+            </a:r>
+            <a:r>
+              <a:rPr lang="en-US" sz="1600" dirty="0" err="1">
+                <a:solidFill>
+                  <a:schemeClr val="bg1"/>
+                </a:solidFill>
+              </a:rPr>
+              <a:t>EventsCenter</a:t>
+            </a:r>
+            <a:endParaRPr lang="en-SG" sz="1600" dirty="0">
+              <a:solidFill>
+                <a:schemeClr val="bg1"/>
+              </a:solidFill>
+            </a:endParaRPr>
+          </a:p>
+        </p:txBody>
+      </p:sp>
+      <p:cxnSp>
+        <p:nvCxnSpPr>
+          <p:cNvPr id="57" name="Straight Connector 56">
+            <a:extLst>
+              <a:ext uri="{FF2B5EF4-FFF2-40B4-BE49-F238E27FC236}">
+                <a16:creationId xmlns:a16="http://schemas.microsoft.com/office/drawing/2014/main" id="{FB434A85-08AA-44BA-A08F-D68141BA0147}"/>
+              </a:ext>
+            </a:extLst>
+          </p:cNvPr>
+          <p:cNvCxnSpPr>
+            <a:cxnSpLocks/>
+          </p:cNvCxnSpPr>
+          <p:nvPr/>
+        </p:nvCxnSpPr>
+        <p:spPr>
+          <a:xfrm>
+            <a:off x="4094739" y="2610296"/>
+            <a:ext cx="0" cy="3087421"/>
+          </a:xfrm>
+          <a:prstGeom prst="line">
+            <a:avLst/>
+          </a:prstGeom>
+          <a:ln w="19050">
+            <a:solidFill>
+              <a:schemeClr val="accent5">
+                <a:lumMod val="75000"/>
+              </a:schemeClr>
+            </a:solidFill>
+            <a:prstDash val="sysDash"/>
+          </a:ln>
+          <a:effectLst/>
+        </p:spPr>
+        <p:style>
+          <a:lnRef idx="1">
+            <a:schemeClr val="accent1"/>
+          </a:lnRef>
+          <a:fillRef idx="2">
+            <a:schemeClr val="accent1"/>
+          </a:fillRef>
+          <a:effectRef idx="1">
+            <a:schemeClr val="accent1"/>
+          </a:effectRef>
+          <a:fontRef idx="minor">
+            <a:schemeClr val="dk1"/>
+          </a:fontRef>
+        </p:style>
+      </p:cxnSp>
+      <p:sp>
+        <p:nvSpPr>
+          <p:cNvPr id="58" name="Rectangle 57">
+            <a:extLst>
+              <a:ext uri="{FF2B5EF4-FFF2-40B4-BE49-F238E27FC236}">
+                <a16:creationId xmlns:a16="http://schemas.microsoft.com/office/drawing/2014/main" id="{9AA3120B-F184-497A-BF98-10CBA66818DA}"/>
+              </a:ext>
+            </a:extLst>
+          </p:cNvPr>
+          <p:cNvSpPr/>
+          <p:nvPr/>
+        </p:nvSpPr>
+        <p:spPr>
+          <a:xfrm>
+            <a:off x="4013162" y="3372785"/>
+            <a:ext cx="142006" cy="1036757"/>
+          </a:xfrm>
+          <a:prstGeom prst="rect">
+            <a:avLst/>
+          </a:prstGeom>
+          <a:solidFill>
+            <a:schemeClr val="accent5">
+              <a:lumMod val="75000"/>
+            </a:schemeClr>
+          </a:solidFill>
+          <a:ln>
+            <a:solidFill>
+              <a:schemeClr val="accent5">
+                <a:lumMod val="75000"/>
+              </a:schemeClr>
+            </a:solidFill>
+          </a:ln>
+          <a:effectLst/>
+        </p:spPr>
+        <p:style>
+          <a:lnRef idx="1">
+            <a:schemeClr val="accent3"/>
+          </a:lnRef>
+          <a:fillRef idx="2">
+            <a:schemeClr val="accent3"/>
+          </a:fillRef>
+          <a:effectRef idx="1">
+            <a:schemeClr val="accent3"/>
+          </a:effectRef>
+          <a:fontRef idx="minor">
+            <a:schemeClr val="dk1"/>
+          </a:fontRef>
+        </p:style>
+        <p:txBody>
+          <a:bodyPr rtlCol="0" anchor="ctr"/>
+          <a:lstStyle/>
+          <a:p>
+            <a:pPr algn="ctr"/>
+            <a:endParaRPr lang="en-SG" sz="1400">
+              <a:solidFill>
+                <a:schemeClr val="dk1"/>
+              </a:solidFill>
+            </a:endParaRPr>
+          </a:p>
+        </p:txBody>
+      </p:sp>
+      <p:cxnSp>
+        <p:nvCxnSpPr>
+          <p:cNvPr id="59" name="Straight Arrow Connector 58">
+            <a:extLst>
+              <a:ext uri="{FF2B5EF4-FFF2-40B4-BE49-F238E27FC236}">
+                <a16:creationId xmlns:a16="http://schemas.microsoft.com/office/drawing/2014/main" id="{A33F5014-7150-4A87-B22D-813E35106CBA}"/>
+              </a:ext>
+            </a:extLst>
+          </p:cNvPr>
+          <p:cNvCxnSpPr>
+            <a:cxnSpLocks/>
+          </p:cNvCxnSpPr>
+          <p:nvPr/>
+        </p:nvCxnSpPr>
+        <p:spPr>
+          <a:xfrm>
+            <a:off x="4155168" y="3505200"/>
+            <a:ext cx="2681778" cy="0"/>
+          </a:xfrm>
+          <a:prstGeom prst="straightConnector1">
+            <a:avLst/>
+          </a:prstGeom>
+          <a:ln w="19050">
+            <a:solidFill>
+              <a:schemeClr val="accent5">
+                <a:lumMod val="75000"/>
+              </a:schemeClr>
+            </a:solidFill>
+            <a:headEnd type="none" w="med" len="med"/>
+            <a:tailEnd type="arrow" w="med" len="med"/>
+          </a:ln>
+        </p:spPr>
+        <p:style>
+          <a:lnRef idx="1">
+            <a:schemeClr val="accent1"/>
+          </a:lnRef>
+          <a:fillRef idx="0">
+            <a:schemeClr val="accent1"/>
+          </a:fillRef>
+          <a:effectRef idx="0">
+            <a:schemeClr val="accent1"/>
+          </a:effectRef>
+          <a:fontRef idx="minor">
+            <a:schemeClr val="tx1"/>
+          </a:fontRef>
+        </p:style>
+      </p:cxnSp>
+      <p:cxnSp>
+        <p:nvCxnSpPr>
+          <p:cNvPr id="60" name="Straight Arrow Connector 59">
+            <a:extLst>
+              <a:ext uri="{FF2B5EF4-FFF2-40B4-BE49-F238E27FC236}">
+                <a16:creationId xmlns:a16="http://schemas.microsoft.com/office/drawing/2014/main" id="{CE59418F-F9A1-49CF-9C46-97D278F1CC51}"/>
+              </a:ext>
+            </a:extLst>
+          </p:cNvPr>
+          <p:cNvCxnSpPr>
+            <a:cxnSpLocks/>
+            <a:endCxn id="58" idx="0"/>
+          </p:cNvCxnSpPr>
+          <p:nvPr/>
+        </p:nvCxnSpPr>
+        <p:spPr>
+          <a:xfrm>
+            <a:off x="1572859" y="3359238"/>
+            <a:ext cx="2511306" cy="13547"/>
+          </a:xfrm>
+          <a:prstGeom prst="straightConnector1">
+            <a:avLst/>
+          </a:prstGeom>
+          <a:ln w="19050">
+            <a:solidFill>
+              <a:srgbClr val="0070C0"/>
+            </a:solidFill>
+            <a:tailEnd type="arrow"/>
+          </a:ln>
+        </p:spPr>
+        <p:style>
+          <a:lnRef idx="1">
+            <a:schemeClr val="accent1"/>
+          </a:lnRef>
+          <a:fillRef idx="0">
+            <a:schemeClr val="accent1"/>
+          </a:fillRef>
+          <a:effectRef idx="0">
+            <a:schemeClr val="accent1"/>
+          </a:effectRef>
+          <a:fontRef idx="minor">
+            <a:schemeClr val="tx1"/>
+          </a:fontRef>
+        </p:style>
+      </p:cxnSp>
+      <p:sp>
+        <p:nvSpPr>
+          <p:cNvPr id="66" name="TextBox 65">
+            <a:extLst>
+              <a:ext uri="{FF2B5EF4-FFF2-40B4-BE49-F238E27FC236}">
+                <a16:creationId xmlns:a16="http://schemas.microsoft.com/office/drawing/2014/main" id="{C7AF464A-A8DA-4914-B627-F573DE04A57C}"/>
+              </a:ext>
+            </a:extLst>
+          </p:cNvPr>
+          <p:cNvSpPr txBox="1"/>
+          <p:nvPr/>
+        </p:nvSpPr>
+        <p:spPr>
+          <a:xfrm>
+            <a:off x="1991226" y="3078392"/>
+            <a:ext cx="1895179" cy="215444"/>
+          </a:xfrm>
+          <a:prstGeom prst="rect">
+            <a:avLst/>
+          </a:prstGeom>
+          <a:noFill/>
+        </p:spPr>
+        <p:txBody>
+          <a:bodyPr wrap="square" lIns="0" tIns="0" rIns="0" bIns="0" rtlCol="0">
+            <a:spAutoFit/>
+          </a:bodyPr>
+          <a:lstStyle/>
+          <a:p>
+            <a:r>
+              <a:rPr lang="en-US" sz="1400" dirty="0">
+                <a:solidFill>
+                  <a:srgbClr val="0070C0"/>
+                </a:solidFill>
+              </a:rPr>
+              <a:t>post(</a:t>
+            </a:r>
+            <a:r>
+              <a:rPr lang="en-US" sz="1400" dirty="0" err="1">
+                <a:solidFill>
+                  <a:srgbClr val="0070C0"/>
+                </a:solidFill>
+              </a:rPr>
+              <a:t>DisplayGmapEvent</a:t>
+            </a:r>
+            <a:r>
+              <a:rPr lang="en-US" sz="1400" dirty="0">
+                <a:solidFill>
+                  <a:srgbClr val="0070C0"/>
+                </a:solidFill>
+              </a:rPr>
+              <a:t>)</a:t>
+            </a:r>
+          </a:p>
+        </p:txBody>
+      </p:sp>
+      <p:sp>
+        <p:nvSpPr>
+          <p:cNvPr id="67" name="Rectangle 62">
+            <a:extLst>
+              <a:ext uri="{FF2B5EF4-FFF2-40B4-BE49-F238E27FC236}">
+                <a16:creationId xmlns:a16="http://schemas.microsoft.com/office/drawing/2014/main" id="{8CF4ADA9-16FC-40AE-8DD1-B5AD3C8EED4C}"/>
+              </a:ext>
+            </a:extLst>
+          </p:cNvPr>
+          <p:cNvSpPr/>
+          <p:nvPr/>
+        </p:nvSpPr>
+        <p:spPr>
+          <a:xfrm>
+            <a:off x="1993958" y="4641383"/>
+            <a:ext cx="1590354" cy="461538"/>
+          </a:xfrm>
+          <a:prstGeom prst="rect">
+            <a:avLst/>
+          </a:prstGeom>
+          <a:solidFill>
+            <a:srgbClr val="0070C0"/>
+          </a:solidFill>
+          <a:ln w="19050">
+            <a:solidFill>
+              <a:srgbClr val="0070C0"/>
+            </a:solidFill>
+          </a:ln>
+          <a:effectLst/>
+        </p:spPr>
+        <p:style>
+          <a:lnRef idx="1">
+            <a:schemeClr val="accent2"/>
+          </a:lnRef>
+          <a:fillRef idx="2">
+            <a:schemeClr val="accent2"/>
+          </a:fillRef>
+          <a:effectRef idx="1">
+            <a:schemeClr val="accent2"/>
+          </a:effectRef>
+          <a:fontRef idx="minor">
+            <a:schemeClr val="dk1"/>
+          </a:fontRef>
+        </p:style>
+        <p:txBody>
+          <a:bodyPr rtlCol="0" anchor="ctr"/>
+          <a:lstStyle/>
+          <a:p>
+            <a:pPr algn="ctr"/>
+            <a:r>
+              <a:rPr lang="en-US" sz="1600" dirty="0" err="1">
+                <a:solidFill>
+                  <a:schemeClr val="bg1"/>
+                </a:solidFill>
+              </a:rPr>
+              <a:t>result:Command</a:t>
+            </a:r>
+            <a:r>
+              <a:rPr lang="en-US" sz="1600" dirty="0">
+                <a:solidFill>
+                  <a:schemeClr val="bg1"/>
+                </a:solidFill>
+              </a:rPr>
+              <a:t> Result</a:t>
+            </a:r>
+            <a:endParaRPr lang="en-SG" sz="1600" dirty="0">
+              <a:solidFill>
+                <a:schemeClr val="bg1"/>
+              </a:solidFill>
+            </a:endParaRPr>
+          </a:p>
+        </p:txBody>
+      </p:sp>
+      <p:sp>
+        <p:nvSpPr>
+          <p:cNvPr id="68" name="Rectangle 67">
+            <a:extLst>
+              <a:ext uri="{FF2B5EF4-FFF2-40B4-BE49-F238E27FC236}">
+                <a16:creationId xmlns:a16="http://schemas.microsoft.com/office/drawing/2014/main" id="{1B0ED1B9-9DEB-4B59-9E03-85F2BA567772}"/>
+              </a:ext>
+            </a:extLst>
+          </p:cNvPr>
+          <p:cNvSpPr/>
+          <p:nvPr/>
+        </p:nvSpPr>
+        <p:spPr>
+          <a:xfrm>
+            <a:off x="2751035" y="5102921"/>
+            <a:ext cx="152400" cy="171376"/>
+          </a:xfrm>
+          <a:prstGeom prst="rect">
+            <a:avLst/>
+          </a:prstGeom>
+          <a:solidFill>
+            <a:srgbClr val="0070C0"/>
+          </a:solidFill>
+          <a:ln>
+            <a:solidFill>
+              <a:srgbClr val="0070C0"/>
+            </a:solidFill>
+          </a:ln>
+          <a:effectLst/>
+        </p:spPr>
+        <p:style>
+          <a:lnRef idx="1">
+            <a:schemeClr val="accent3"/>
+          </a:lnRef>
+          <a:fillRef idx="2">
+            <a:schemeClr val="accent3"/>
+          </a:fillRef>
+          <a:effectRef idx="1">
+            <a:schemeClr val="accent3"/>
+          </a:effectRef>
+          <a:fontRef idx="minor">
+            <a:schemeClr val="dk1"/>
+          </a:fontRef>
+        </p:style>
+        <p:txBody>
+          <a:bodyPr rtlCol="0" anchor="ctr"/>
+          <a:lstStyle/>
+          <a:p>
+            <a:pPr algn="ctr"/>
+            <a:endParaRPr lang="en-SG" sz="1400"/>
+          </a:p>
+        </p:txBody>
+      </p:sp>
+      <p:cxnSp>
+        <p:nvCxnSpPr>
+          <p:cNvPr id="69" name="Straight Arrow Connector 68">
+            <a:extLst>
+              <a:ext uri="{FF2B5EF4-FFF2-40B4-BE49-F238E27FC236}">
+                <a16:creationId xmlns:a16="http://schemas.microsoft.com/office/drawing/2014/main" id="{FD952B03-AE67-4544-AF30-381DE1C21F2E}"/>
+              </a:ext>
+            </a:extLst>
+          </p:cNvPr>
+          <p:cNvCxnSpPr>
+            <a:cxnSpLocks/>
+            <a:endCxn id="68" idx="2"/>
+          </p:cNvCxnSpPr>
+          <p:nvPr/>
+        </p:nvCxnSpPr>
+        <p:spPr>
+          <a:xfrm>
+            <a:off x="1664954" y="5269584"/>
+            <a:ext cx="1162281" cy="4713"/>
+          </a:xfrm>
+          <a:prstGeom prst="straightConnector1">
+            <a:avLst/>
+          </a:prstGeom>
+          <a:ln w="19050">
+            <a:solidFill>
+              <a:srgbClr val="0070C0"/>
+            </a:solidFill>
+            <a:prstDash val="sysDash"/>
+            <a:headEnd type="arrow" w="med" len="med"/>
+            <a:tailEnd type="none" w="med" len="med"/>
+          </a:ln>
+        </p:spPr>
+        <p:style>
+          <a:lnRef idx="1">
+            <a:schemeClr val="accent1"/>
+          </a:lnRef>
+          <a:fillRef idx="0">
+            <a:schemeClr val="accent1"/>
+          </a:fillRef>
+          <a:effectRef idx="0">
+            <a:schemeClr val="accent1"/>
+          </a:effectRef>
+          <a:fontRef idx="minor">
+            <a:schemeClr val="tx1"/>
+          </a:fontRef>
+        </p:style>
+      </p:cxnSp>
+      <p:cxnSp>
+        <p:nvCxnSpPr>
+          <p:cNvPr id="70" name="Straight Arrow Connector 69">
+            <a:extLst>
+              <a:ext uri="{FF2B5EF4-FFF2-40B4-BE49-F238E27FC236}">
+                <a16:creationId xmlns:a16="http://schemas.microsoft.com/office/drawing/2014/main" id="{0AF84151-C5D4-44C2-919C-2C06310A5401}"/>
+              </a:ext>
+            </a:extLst>
+          </p:cNvPr>
+          <p:cNvCxnSpPr>
+            <a:cxnSpLocks/>
+            <a:endCxn id="67" idx="1"/>
+          </p:cNvCxnSpPr>
+          <p:nvPr/>
+        </p:nvCxnSpPr>
+        <p:spPr>
+          <a:xfrm>
+            <a:off x="1653251" y="4872152"/>
+            <a:ext cx="340707" cy="0"/>
+          </a:xfrm>
+          <a:prstGeom prst="straightConnector1">
+            <a:avLst/>
+          </a:prstGeom>
+          <a:ln w="19050">
+            <a:headEnd type="none" w="med" len="med"/>
+            <a:tailEnd type="arrow" w="med" len="med"/>
+          </a:ln>
+        </p:spPr>
+        <p:style>
+          <a:lnRef idx="1">
+            <a:schemeClr val="accent1"/>
+          </a:lnRef>
+          <a:fillRef idx="0">
+            <a:schemeClr val="accent1"/>
+          </a:fillRef>
+          <a:effectRef idx="0">
+            <a:schemeClr val="accent1"/>
+          </a:effectRef>
+          <a:fontRef idx="minor">
+            <a:schemeClr val="tx1"/>
+          </a:fontRef>
+        </p:style>
+      </p:cxnSp>
+      <p:sp>
+        <p:nvSpPr>
+          <p:cNvPr id="85" name="TextBox 84">
+            <a:extLst>
+              <a:ext uri="{FF2B5EF4-FFF2-40B4-BE49-F238E27FC236}">
+                <a16:creationId xmlns:a16="http://schemas.microsoft.com/office/drawing/2014/main" id="{636F0F49-39D5-4170-8B6A-52251D8129AC}"/>
+              </a:ext>
+            </a:extLst>
+          </p:cNvPr>
+          <p:cNvSpPr txBox="1"/>
+          <p:nvPr/>
+        </p:nvSpPr>
+        <p:spPr>
+          <a:xfrm>
+            <a:off x="4698964" y="3223549"/>
+            <a:ext cx="2110037" cy="215444"/>
+          </a:xfrm>
+          <a:prstGeom prst="rect">
+            <a:avLst/>
+          </a:prstGeom>
+          <a:noFill/>
+        </p:spPr>
+        <p:txBody>
+          <a:bodyPr wrap="square" lIns="0" tIns="0" rIns="0" bIns="0" rtlCol="0">
+            <a:spAutoFit/>
+          </a:bodyPr>
+          <a:lstStyle/>
+          <a:p>
+            <a:r>
+              <a:rPr lang="en-US" sz="1400" dirty="0" err="1">
+                <a:solidFill>
+                  <a:srgbClr val="0070C0"/>
+                </a:solidFill>
+              </a:rPr>
+              <a:t>handleDisplayGmapEvent</a:t>
+            </a:r>
+            <a:r>
+              <a:rPr lang="en-US" sz="1400" dirty="0">
+                <a:solidFill>
+                  <a:srgbClr val="0070C0"/>
+                </a:solidFill>
+              </a:rPr>
+              <a:t>()</a:t>
+            </a:r>
+          </a:p>
+        </p:txBody>
+      </p:sp>
+      <p:grpSp>
+        <p:nvGrpSpPr>
+          <p:cNvPr id="87" name="Group 86">
+            <a:extLst>
+              <a:ext uri="{FF2B5EF4-FFF2-40B4-BE49-F238E27FC236}">
+                <a16:creationId xmlns:a16="http://schemas.microsoft.com/office/drawing/2014/main" id="{E50121B5-28A7-44BB-9CEC-8D00C0F2DC6D}"/>
+              </a:ext>
+            </a:extLst>
+          </p:cNvPr>
+          <p:cNvGrpSpPr/>
+          <p:nvPr/>
+        </p:nvGrpSpPr>
+        <p:grpSpPr>
+          <a:xfrm>
+            <a:off x="6936226" y="3661987"/>
+            <a:ext cx="356874" cy="448545"/>
+            <a:chOff x="1147591" y="5678571"/>
+            <a:chExt cx="104673" cy="158824"/>
+          </a:xfrm>
+        </p:grpSpPr>
+        <p:sp>
+          <p:nvSpPr>
+            <p:cNvPr id="88" name="Freeform 11">
+              <a:extLst>
+                <a:ext uri="{FF2B5EF4-FFF2-40B4-BE49-F238E27FC236}">
+                  <a16:creationId xmlns:a16="http://schemas.microsoft.com/office/drawing/2014/main" id="{5163826D-CE8C-4005-B72C-94B517526C70}"/>
+                </a:ext>
+              </a:extLst>
+            </p:cNvPr>
+            <p:cNvSpPr/>
+            <p:nvPr/>
+          </p:nvSpPr>
+          <p:spPr>
+            <a:xfrm rot="9447554" flipH="1">
+              <a:off x="1203269" y="5678571"/>
+              <a:ext cx="48995" cy="94527"/>
+            </a:xfrm>
+            <a:custGeom>
+              <a:avLst/>
+              <a:gdLst>
+                <a:gd name="connsiteX0" fmla="*/ 0 w 226400"/>
+                <a:gd name="connsiteY0" fmla="*/ 32920 h 171466"/>
+                <a:gd name="connsiteX1" fmla="*/ 157018 w 226400"/>
+                <a:gd name="connsiteY1" fmla="*/ 5211 h 171466"/>
+                <a:gd name="connsiteX2" fmla="*/ 221673 w 226400"/>
+                <a:gd name="connsiteY2" fmla="*/ 125284 h 171466"/>
+                <a:gd name="connsiteX3" fmla="*/ 36945 w 226400"/>
+                <a:gd name="connsiteY3" fmla="*/ 171466 h 171466"/>
+              </a:gdLst>
+              <a:ahLst/>
+              <a:cxnLst>
+                <a:cxn ang="0">
+                  <a:pos x="connsiteX0" y="connsiteY0"/>
+                </a:cxn>
+                <a:cxn ang="0">
+                  <a:pos x="connsiteX1" y="connsiteY1"/>
+                </a:cxn>
+                <a:cxn ang="0">
+                  <a:pos x="connsiteX2" y="connsiteY2"/>
+                </a:cxn>
+                <a:cxn ang="0">
+                  <a:pos x="connsiteX3" y="connsiteY3"/>
+                </a:cxn>
+              </a:cxnLst>
+              <a:rect l="l" t="t" r="r" b="b"/>
+              <a:pathLst>
+                <a:path w="226400" h="171466">
+                  <a:moveTo>
+                    <a:pt x="0" y="32920"/>
+                  </a:moveTo>
+                  <a:cubicBezTo>
+                    <a:pt x="60036" y="11368"/>
+                    <a:pt x="120073" y="-10183"/>
+                    <a:pt x="157018" y="5211"/>
+                  </a:cubicBezTo>
+                  <a:cubicBezTo>
+                    <a:pt x="193963" y="20605"/>
+                    <a:pt x="241685" y="97575"/>
+                    <a:pt x="221673" y="125284"/>
+                  </a:cubicBezTo>
+                  <a:cubicBezTo>
+                    <a:pt x="201661" y="152993"/>
+                    <a:pt x="119303" y="162229"/>
+                    <a:pt x="36945" y="171466"/>
+                  </a:cubicBezTo>
+                </a:path>
+              </a:pathLst>
+            </a:custGeom>
+            <a:ln w="19050">
+              <a:solidFill>
+                <a:srgbClr val="00B050"/>
+              </a:solidFill>
+              <a:headEnd type="arrow" w="med" len="med"/>
+              <a:tailEnd type="none" w="med" len="med"/>
+            </a:ln>
+          </p:spPr>
+          <p:style>
+            <a:lnRef idx="1">
+              <a:schemeClr val="accent1"/>
+            </a:lnRef>
+            <a:fillRef idx="0">
+              <a:schemeClr val="accent1"/>
+            </a:fillRef>
+            <a:effectRef idx="0">
+              <a:schemeClr val="accent1"/>
+            </a:effectRef>
+            <a:fontRef idx="minor">
+              <a:schemeClr val="tx1"/>
+            </a:fontRef>
+          </p:style>
+          <p:txBody>
+            <a:bodyPr rtlCol="0" anchor="ctr"/>
+            <a:lstStyle/>
+            <a:p>
+              <a:pPr algn="ctr"/>
+              <a:endParaRPr lang="en-SG"/>
+            </a:p>
+          </p:txBody>
+        </p:sp>
+        <p:sp>
+          <p:nvSpPr>
+            <p:cNvPr id="89" name="Rectangle 88">
+              <a:extLst>
+                <a:ext uri="{FF2B5EF4-FFF2-40B4-BE49-F238E27FC236}">
+                  <a16:creationId xmlns:a16="http://schemas.microsoft.com/office/drawing/2014/main" id="{2637FC74-B287-421D-868A-CB91DDA71974}"/>
+                </a:ext>
+              </a:extLst>
+            </p:cNvPr>
+            <p:cNvSpPr/>
+            <p:nvPr/>
+          </p:nvSpPr>
+          <p:spPr>
+            <a:xfrm>
+              <a:off x="1147591" y="5691229"/>
+              <a:ext cx="66045" cy="146166"/>
+            </a:xfrm>
+            <a:prstGeom prst="rect">
+              <a:avLst/>
+            </a:prstGeom>
+            <a:solidFill>
+              <a:srgbClr val="00B050"/>
+            </a:solidFill>
+            <a:ln>
+              <a:solidFill>
+                <a:schemeClr val="bg1"/>
+              </a:solidFill>
+            </a:ln>
+            <a:effectLst/>
+          </p:spPr>
+          <p:style>
+            <a:lnRef idx="1">
+              <a:schemeClr val="accent3"/>
+            </a:lnRef>
+            <a:fillRef idx="2">
+              <a:schemeClr val="accent3"/>
+            </a:fillRef>
+            <a:effectRef idx="1">
+              <a:schemeClr val="accent3"/>
+            </a:effectRef>
+            <a:fontRef idx="minor">
+              <a:schemeClr val="dk1"/>
+            </a:fontRef>
+          </p:style>
+          <p:txBody>
+            <a:bodyPr rtlCol="0" anchor="ctr"/>
+            <a:lstStyle/>
+            <a:p>
+              <a:pPr algn="ctr"/>
+              <a:endParaRPr lang="en-SG" sz="1400">
+                <a:solidFill>
+                  <a:schemeClr val="dk1"/>
+                </a:solidFill>
+              </a:endParaRPr>
+            </a:p>
+          </p:txBody>
+        </p:sp>
+      </p:grpSp>
+      <p:sp>
+        <p:nvSpPr>
+          <p:cNvPr id="91" name="TextBox 90">
+            <a:extLst>
+              <a:ext uri="{FF2B5EF4-FFF2-40B4-BE49-F238E27FC236}">
+                <a16:creationId xmlns:a16="http://schemas.microsoft.com/office/drawing/2014/main" id="{BC469986-DF47-44FD-9599-A88358AD1182}"/>
+              </a:ext>
+            </a:extLst>
+          </p:cNvPr>
+          <p:cNvSpPr txBox="1"/>
+          <p:nvPr/>
+        </p:nvSpPr>
+        <p:spPr>
+          <a:xfrm>
+            <a:off x="7355700" y="3697752"/>
+            <a:ext cx="1178699" cy="215444"/>
+          </a:xfrm>
+          <a:prstGeom prst="rect">
+            <a:avLst/>
+          </a:prstGeom>
+          <a:noFill/>
+        </p:spPr>
+        <p:txBody>
+          <a:bodyPr wrap="square" lIns="0" tIns="0" rIns="0" bIns="0" rtlCol="0">
+            <a:spAutoFit/>
+          </a:bodyPr>
+          <a:lstStyle/>
+          <a:p>
+            <a:r>
+              <a:rPr lang="en-US" sz="1400" dirty="0" err="1">
                 <a:solidFill>
                   <a:srgbClr val="00B050"/>
                 </a:solidFill>
               </a:rPr>
-              <a:t>handle(</a:t>
-            </a:r>
-            <a:r>
-              <a:rPr lang="en-US" sz="1400" dirty="0" err="1" smtClean="0">
+              <a:t>loadMapPage</a:t>
+            </a:r>
+            <a:r>
+              <a:rPr lang="en-US" sz="1400" dirty="0">
+                <a:solidFill>
+                  <a:srgbClr val="00B050"/>
+                </a:solidFill>
+              </a:rPr>
+              <a:t>()</a:t>
+            </a:r>
+          </a:p>
+        </p:txBody>
+      </p:sp>
+    </p:spTree>
+    <p:extLst>
+      <p:ext uri="{BB962C8B-B14F-4D97-AF65-F5344CB8AC3E}">
+        <p14:creationId xmlns:p14="http://schemas.microsoft.com/office/powerpoint/2010/main" val="3877614069"/>
+      </p:ext>
+    </p:extLst>
+  </p:cSld>
+  <p:clrMapOvr>
+    <a:masterClrMapping/>
+  </p:clrMapOvr>
+</p:sld>
+</file>
+
+<file path=ppt/slides/slide3.xml><?xml version="1.0" encoding="utf-8"?>
+<p:sld xmlns:a="http://schemas.openxmlformats.org/drawingml/2006/main" xmlns:r="http://schemas.openxmlformats.org/officeDocument/2006/relationships" xmlns:p="http://schemas.openxmlformats.org/presentationml/2006/main">
+  <p:cSld>
+    <p:spTree>
+      <p:nvGrpSpPr>
+        <p:cNvPr id="1" name=""/>
+        <p:cNvGrpSpPr/>
+        <p:nvPr/>
+      </p:nvGrpSpPr>
+      <p:grpSpPr>
+        <a:xfrm>
+          <a:off x="0" y="0"/>
+          <a:ext cx="0" cy="0"/>
+          <a:chOff x="0" y="0"/>
+          <a:chExt cx="0" cy="0"/>
+        </a:xfrm>
+      </p:grpSpPr>
+      <p:sp>
+        <p:nvSpPr>
+          <p:cNvPr id="53" name="Rectangle 62">
+            <a:extLst>
+              <a:ext uri="{FF2B5EF4-FFF2-40B4-BE49-F238E27FC236}">
+                <a16:creationId xmlns:a16="http://schemas.microsoft.com/office/drawing/2014/main" id="{7F026634-FA67-425E-ADBF-9FC6F7D9F2DF}"/>
+              </a:ext>
+            </a:extLst>
+          </p:cNvPr>
+          <p:cNvSpPr/>
+          <p:nvPr/>
+        </p:nvSpPr>
+        <p:spPr>
+          <a:xfrm>
+            <a:off x="6223803" y="2209800"/>
+            <a:ext cx="1424845" cy="433506"/>
+          </a:xfrm>
+          <a:prstGeom prst="rect">
+            <a:avLst/>
+          </a:prstGeom>
+          <a:solidFill>
+            <a:srgbClr val="00B050"/>
+          </a:solidFill>
+          <a:ln w="19050">
+            <a:solidFill>
+              <a:srgbClr val="00B050"/>
+            </a:solidFill>
+          </a:ln>
+          <a:effectLst/>
+        </p:spPr>
+        <p:style>
+          <a:lnRef idx="1">
+            <a:schemeClr val="accent2"/>
+          </a:lnRef>
+          <a:fillRef idx="2">
+            <a:schemeClr val="accent2"/>
+          </a:fillRef>
+          <a:effectRef idx="1">
+            <a:schemeClr val="accent2"/>
+          </a:effectRef>
+          <a:fontRef idx="minor">
+            <a:schemeClr val="dk1"/>
+          </a:fontRef>
+        </p:style>
+        <p:txBody>
+          <a:bodyPr rtlCol="0" anchor="ctr"/>
+          <a:lstStyle/>
+          <a:p>
+            <a:pPr algn="ctr"/>
+            <a:r>
+              <a:rPr lang="en-US" sz="1600" dirty="0">
+                <a:solidFill>
+                  <a:schemeClr val="bg1"/>
+                </a:solidFill>
+              </a:rPr>
+              <a:t>:</a:t>
+            </a:r>
+            <a:r>
+              <a:rPr lang="en-US" sz="1600" dirty="0" err="1">
+                <a:solidFill>
+                  <a:schemeClr val="bg1"/>
+                </a:solidFill>
+              </a:rPr>
+              <a:t>BrowserPanel</a:t>
+            </a:r>
+            <a:endParaRPr lang="en-SG" sz="1600" dirty="0">
+              <a:solidFill>
+                <a:schemeClr val="bg1"/>
+              </a:solidFill>
+            </a:endParaRPr>
+          </a:p>
+        </p:txBody>
+      </p:sp>
+      <p:cxnSp>
+        <p:nvCxnSpPr>
+          <p:cNvPr id="54" name="Straight Connector 53">
+            <a:extLst>
+              <a:ext uri="{FF2B5EF4-FFF2-40B4-BE49-F238E27FC236}">
+                <a16:creationId xmlns:a16="http://schemas.microsoft.com/office/drawing/2014/main" id="{F1153510-0152-4F4F-9223-D9F8F5F783F0}"/>
+              </a:ext>
+            </a:extLst>
+          </p:cNvPr>
+          <p:cNvCxnSpPr>
+            <a:cxnSpLocks/>
+            <a:stCxn id="53" idx="2"/>
+          </p:cNvCxnSpPr>
+          <p:nvPr/>
+        </p:nvCxnSpPr>
+        <p:spPr>
+          <a:xfrm flipH="1">
+            <a:off x="6936224" y="2643306"/>
+            <a:ext cx="2" cy="2934486"/>
+          </a:xfrm>
+          <a:prstGeom prst="line">
+            <a:avLst/>
+          </a:prstGeom>
+          <a:ln w="19050">
+            <a:solidFill>
+              <a:srgbClr val="00B050"/>
+            </a:solidFill>
+            <a:prstDash val="sysDash"/>
+          </a:ln>
+          <a:effectLst/>
+        </p:spPr>
+        <p:style>
+          <a:lnRef idx="1">
+            <a:schemeClr val="accent1"/>
+          </a:lnRef>
+          <a:fillRef idx="2">
+            <a:schemeClr val="accent1"/>
+          </a:fillRef>
+          <a:effectRef idx="1">
+            <a:schemeClr val="accent1"/>
+          </a:effectRef>
+          <a:fontRef idx="minor">
+            <a:schemeClr val="dk1"/>
+          </a:fontRef>
+        </p:style>
+      </p:cxnSp>
+      <p:sp>
+        <p:nvSpPr>
+          <p:cNvPr id="55" name="Rectangle 54">
+            <a:extLst>
+              <a:ext uri="{FF2B5EF4-FFF2-40B4-BE49-F238E27FC236}">
+                <a16:creationId xmlns:a16="http://schemas.microsoft.com/office/drawing/2014/main" id="{FB6A1251-F187-4CD9-A09E-67763A30BB9F}"/>
+              </a:ext>
+            </a:extLst>
+          </p:cNvPr>
+          <p:cNvSpPr/>
+          <p:nvPr/>
+        </p:nvSpPr>
+        <p:spPr>
+          <a:xfrm>
+            <a:off x="6847520" y="4130940"/>
+            <a:ext cx="198555" cy="794359"/>
+          </a:xfrm>
+          <a:prstGeom prst="rect">
+            <a:avLst/>
+          </a:prstGeom>
+          <a:solidFill>
+            <a:srgbClr val="00B050"/>
+          </a:solidFill>
+          <a:ln>
+            <a:solidFill>
+              <a:srgbClr val="00B050"/>
+            </a:solidFill>
+          </a:ln>
+          <a:effectLst/>
+        </p:spPr>
+        <p:style>
+          <a:lnRef idx="1">
+            <a:schemeClr val="accent3"/>
+          </a:lnRef>
+          <a:fillRef idx="2">
+            <a:schemeClr val="accent3"/>
+          </a:fillRef>
+          <a:effectRef idx="1">
+            <a:schemeClr val="accent3"/>
+          </a:effectRef>
+          <a:fontRef idx="minor">
+            <a:schemeClr val="dk1"/>
+          </a:fontRef>
+        </p:style>
+        <p:txBody>
+          <a:bodyPr rtlCol="0" anchor="ctr"/>
+          <a:lstStyle/>
+          <a:p>
+            <a:pPr algn="ctr"/>
+            <a:endParaRPr lang="en-SG" sz="1400">
+              <a:solidFill>
+                <a:schemeClr val="dk1"/>
+              </a:solidFill>
+            </a:endParaRPr>
+          </a:p>
+        </p:txBody>
+      </p:sp>
+      <p:sp>
+        <p:nvSpPr>
+          <p:cNvPr id="56" name="Rectangle 62">
+            <a:extLst>
+              <a:ext uri="{FF2B5EF4-FFF2-40B4-BE49-F238E27FC236}">
+                <a16:creationId xmlns:a16="http://schemas.microsoft.com/office/drawing/2014/main" id="{868FFC14-D7B8-477B-BA73-0E6F9D7C6556}"/>
+              </a:ext>
+            </a:extLst>
+          </p:cNvPr>
+          <p:cNvSpPr/>
+          <p:nvPr/>
+        </p:nvSpPr>
+        <p:spPr>
+          <a:xfrm>
+            <a:off x="3429154" y="2170496"/>
+            <a:ext cx="1371600" cy="433506"/>
+          </a:xfrm>
+          <a:prstGeom prst="rect">
+            <a:avLst/>
+          </a:prstGeom>
+          <a:solidFill>
+            <a:schemeClr val="accent5">
+              <a:lumMod val="75000"/>
+            </a:schemeClr>
+          </a:solidFill>
+          <a:ln w="19050">
+            <a:solidFill>
+              <a:schemeClr val="accent5">
+                <a:lumMod val="75000"/>
+              </a:schemeClr>
+            </a:solidFill>
+          </a:ln>
+          <a:effectLst/>
+        </p:spPr>
+        <p:style>
+          <a:lnRef idx="1">
+            <a:schemeClr val="accent2"/>
+          </a:lnRef>
+          <a:fillRef idx="2">
+            <a:schemeClr val="accent2"/>
+          </a:fillRef>
+          <a:effectRef idx="1">
+            <a:schemeClr val="accent2"/>
+          </a:effectRef>
+          <a:fontRef idx="minor">
+            <a:schemeClr val="dk1"/>
+          </a:fontRef>
+        </p:style>
+        <p:txBody>
+          <a:bodyPr rtlCol="0" anchor="ctr"/>
+          <a:lstStyle/>
+          <a:p>
+            <a:pPr algn="ctr"/>
+            <a:r>
+              <a:rPr lang="en-US" sz="1600" dirty="0">
+                <a:solidFill>
+                  <a:schemeClr val="bg1"/>
+                </a:solidFill>
+              </a:rPr>
+              <a:t>:</a:t>
+            </a:r>
+            <a:r>
+              <a:rPr lang="en-US" sz="1600" dirty="0" err="1">
+                <a:solidFill>
+                  <a:schemeClr val="bg1"/>
+                </a:solidFill>
+              </a:rPr>
+              <a:t>EventsCenter</a:t>
+            </a:r>
+            <a:endParaRPr lang="en-SG" sz="1600" dirty="0">
+              <a:solidFill>
+                <a:schemeClr val="bg1"/>
+              </a:solidFill>
+            </a:endParaRPr>
+          </a:p>
+        </p:txBody>
+      </p:sp>
+      <p:cxnSp>
+        <p:nvCxnSpPr>
+          <p:cNvPr id="57" name="Straight Connector 56">
+            <a:extLst>
+              <a:ext uri="{FF2B5EF4-FFF2-40B4-BE49-F238E27FC236}">
+                <a16:creationId xmlns:a16="http://schemas.microsoft.com/office/drawing/2014/main" id="{FB434A85-08AA-44BA-A08F-D68141BA0147}"/>
+              </a:ext>
+            </a:extLst>
+          </p:cNvPr>
+          <p:cNvCxnSpPr>
+            <a:cxnSpLocks/>
+          </p:cNvCxnSpPr>
+          <p:nvPr/>
+        </p:nvCxnSpPr>
+        <p:spPr>
+          <a:xfrm>
+            <a:off x="4094739" y="2610296"/>
+            <a:ext cx="0" cy="2876104"/>
+          </a:xfrm>
+          <a:prstGeom prst="line">
+            <a:avLst/>
+          </a:prstGeom>
+          <a:ln w="19050">
+            <a:solidFill>
+              <a:schemeClr val="accent5">
+                <a:lumMod val="75000"/>
+              </a:schemeClr>
+            </a:solidFill>
+            <a:prstDash val="sysDash"/>
+          </a:ln>
+          <a:effectLst/>
+        </p:spPr>
+        <p:style>
+          <a:lnRef idx="1">
+            <a:schemeClr val="accent1"/>
+          </a:lnRef>
+          <a:fillRef idx="2">
+            <a:schemeClr val="accent1"/>
+          </a:fillRef>
+          <a:effectRef idx="1">
+            <a:schemeClr val="accent1"/>
+          </a:effectRef>
+          <a:fontRef idx="minor">
+            <a:schemeClr val="dk1"/>
+          </a:fontRef>
+        </p:style>
+      </p:cxnSp>
+      <p:sp>
+        <p:nvSpPr>
+          <p:cNvPr id="58" name="Rectangle 57">
+            <a:extLst>
+              <a:ext uri="{FF2B5EF4-FFF2-40B4-BE49-F238E27FC236}">
+                <a16:creationId xmlns:a16="http://schemas.microsoft.com/office/drawing/2014/main" id="{9AA3120B-F184-497A-BF98-10CBA66818DA}"/>
+              </a:ext>
+            </a:extLst>
+          </p:cNvPr>
+          <p:cNvSpPr/>
+          <p:nvPr/>
+        </p:nvSpPr>
+        <p:spPr>
+          <a:xfrm>
+            <a:off x="4023736" y="4004785"/>
+            <a:ext cx="142006" cy="1036757"/>
+          </a:xfrm>
+          <a:prstGeom prst="rect">
+            <a:avLst/>
+          </a:prstGeom>
+          <a:solidFill>
+            <a:schemeClr val="accent5">
+              <a:lumMod val="75000"/>
+            </a:schemeClr>
+          </a:solidFill>
+          <a:ln>
+            <a:solidFill>
+              <a:schemeClr val="accent5">
+                <a:lumMod val="75000"/>
+              </a:schemeClr>
+            </a:solidFill>
+          </a:ln>
+          <a:effectLst/>
+        </p:spPr>
+        <p:style>
+          <a:lnRef idx="1">
+            <a:schemeClr val="accent3"/>
+          </a:lnRef>
+          <a:fillRef idx="2">
+            <a:schemeClr val="accent3"/>
+          </a:fillRef>
+          <a:effectRef idx="1">
+            <a:schemeClr val="accent3"/>
+          </a:effectRef>
+          <a:fontRef idx="minor">
+            <a:schemeClr val="dk1"/>
+          </a:fontRef>
+        </p:style>
+        <p:txBody>
+          <a:bodyPr rtlCol="0" anchor="ctr"/>
+          <a:lstStyle/>
+          <a:p>
+            <a:pPr algn="ctr"/>
+            <a:endParaRPr lang="en-SG" sz="1400">
+              <a:solidFill>
+                <a:schemeClr val="dk1"/>
+              </a:solidFill>
+            </a:endParaRPr>
+          </a:p>
+        </p:txBody>
+      </p:sp>
+      <p:cxnSp>
+        <p:nvCxnSpPr>
+          <p:cNvPr id="59" name="Straight Arrow Connector 58">
+            <a:extLst>
+              <a:ext uri="{FF2B5EF4-FFF2-40B4-BE49-F238E27FC236}">
+                <a16:creationId xmlns:a16="http://schemas.microsoft.com/office/drawing/2014/main" id="{A33F5014-7150-4A87-B22D-813E35106CBA}"/>
+              </a:ext>
+            </a:extLst>
+          </p:cNvPr>
+          <p:cNvCxnSpPr>
+            <a:cxnSpLocks/>
+          </p:cNvCxnSpPr>
+          <p:nvPr/>
+        </p:nvCxnSpPr>
+        <p:spPr>
+          <a:xfrm>
+            <a:off x="4165742" y="4137200"/>
+            <a:ext cx="2681778" cy="0"/>
+          </a:xfrm>
+          <a:prstGeom prst="straightConnector1">
+            <a:avLst/>
+          </a:prstGeom>
+          <a:ln w="19050">
+            <a:solidFill>
+              <a:schemeClr val="accent5">
+                <a:lumMod val="75000"/>
+              </a:schemeClr>
+            </a:solidFill>
+            <a:headEnd type="none" w="med" len="med"/>
+            <a:tailEnd type="arrow" w="med" len="med"/>
+          </a:ln>
+        </p:spPr>
+        <p:style>
+          <a:lnRef idx="1">
+            <a:schemeClr val="accent1"/>
+          </a:lnRef>
+          <a:fillRef idx="0">
+            <a:schemeClr val="accent1"/>
+          </a:fillRef>
+          <a:effectRef idx="0">
+            <a:schemeClr val="accent1"/>
+          </a:effectRef>
+          <a:fontRef idx="minor">
+            <a:schemeClr val="tx1"/>
+          </a:fontRef>
+        </p:style>
+      </p:cxnSp>
+      <p:sp>
+        <p:nvSpPr>
+          <p:cNvPr id="66" name="TextBox 65">
+            <a:extLst>
+              <a:ext uri="{FF2B5EF4-FFF2-40B4-BE49-F238E27FC236}">
+                <a16:creationId xmlns:a16="http://schemas.microsoft.com/office/drawing/2014/main" id="{C7AF464A-A8DA-4914-B627-F573DE04A57C}"/>
+              </a:ext>
+            </a:extLst>
+          </p:cNvPr>
+          <p:cNvSpPr txBox="1"/>
+          <p:nvPr/>
+        </p:nvSpPr>
+        <p:spPr>
+          <a:xfrm>
+            <a:off x="2001800" y="3710392"/>
+            <a:ext cx="1895179" cy="215444"/>
+          </a:xfrm>
+          <a:prstGeom prst="rect">
+            <a:avLst/>
+          </a:prstGeom>
+          <a:noFill/>
+        </p:spPr>
+        <p:txBody>
+          <a:bodyPr wrap="square" lIns="0" tIns="0" rIns="0" bIns="0" rtlCol="0">
+            <a:spAutoFit/>
+          </a:bodyPr>
+          <a:lstStyle/>
+          <a:p>
+            <a:r>
+              <a:rPr lang="en-US" sz="1400" dirty="0">
+                <a:solidFill>
+                  <a:srgbClr val="00B050"/>
+                </a:solidFill>
+              </a:rPr>
+              <a:t>raise(</a:t>
+            </a:r>
+            <a:r>
+              <a:rPr lang="en-US" sz="1400" dirty="0" err="1">
                 <a:solidFill>
                   <a:srgbClr val="00B050"/>
                 </a:solidFill>
@@ -4825,31 +6380,32 @@
               <a:t>DisplayGmapEvent</a:t>
             </a:r>
             <a:r>
-              <a:rPr lang="en-US" sz="1400" dirty="0" smtClean="0">
+              <a:rPr lang="en-US" sz="1400" dirty="0">
                 <a:solidFill>
                   <a:srgbClr val="00B050"/>
                 </a:solidFill>
               </a:rPr>
               <a:t>)</a:t>
             </a:r>
-            <a:endParaRPr lang="en-US" sz="1400" dirty="0">
-              <a:solidFill>
-                <a:srgbClr val="00B050"/>
-              </a:solidFill>
-            </a:endParaRPr>
-          </a:p>
-        </p:txBody>
-      </p:sp>
-      <p:sp>
-        <p:nvSpPr>
-          <p:cNvPr id="75" name="TextBox 74"/>
+          </a:p>
+        </p:txBody>
+      </p:sp>
+      <p:sp>
+        <p:nvSpPr>
+          <p:cNvPr id="85" name="TextBox 84">
+            <a:extLst>
+              <a:ext uri="{FF2B5EF4-FFF2-40B4-BE49-F238E27FC236}">
+                <a16:creationId xmlns:a16="http://schemas.microsoft.com/office/drawing/2014/main" id="{636F0F49-39D5-4170-8B6A-52251D8129AC}"/>
+              </a:ext>
+            </a:extLst>
+          </p:cNvPr>
           <p:cNvSpPr txBox="1"/>
           <p:nvPr/>
         </p:nvSpPr>
         <p:spPr>
           <a:xfrm>
-            <a:off x="646528" y="3067974"/>
-            <a:ext cx="582290" cy="215370"/>
+            <a:off x="4709538" y="3855549"/>
+            <a:ext cx="2110037" cy="215444"/>
           </a:xfrm>
           <a:prstGeom prst="rect">
             <a:avLst/>
@@ -4863,17 +6419,713 @@
           <a:lstStyle/>
           <a:p>
             <a:r>
-              <a:rPr lang="en-US" sz="1400" dirty="0" smtClean="0"/>
-              <a:t>display</a:t>
-            </a:r>
-            <a:endParaRPr lang="en-US" sz="1400" dirty="0"/>
+              <a:rPr lang="en-US" sz="1400" dirty="0" err="1">
+                <a:solidFill>
+                  <a:srgbClr val="0070C0"/>
+                </a:solidFill>
+              </a:rPr>
+              <a:t>handleDisplayGmapEvent</a:t>
+            </a:r>
+            <a:r>
+              <a:rPr lang="en-US" sz="1400" dirty="0">
+                <a:solidFill>
+                  <a:srgbClr val="0070C0"/>
+                </a:solidFill>
+              </a:rPr>
+              <a:t>()</a:t>
+            </a:r>
+          </a:p>
+        </p:txBody>
+      </p:sp>
+      <p:grpSp>
+        <p:nvGrpSpPr>
+          <p:cNvPr id="87" name="Group 86">
+            <a:extLst>
+              <a:ext uri="{FF2B5EF4-FFF2-40B4-BE49-F238E27FC236}">
+                <a16:creationId xmlns:a16="http://schemas.microsoft.com/office/drawing/2014/main" id="{E50121B5-28A7-44BB-9CEC-8D00C0F2DC6D}"/>
+              </a:ext>
+            </a:extLst>
+          </p:cNvPr>
+          <p:cNvGrpSpPr/>
+          <p:nvPr/>
+        </p:nvGrpSpPr>
+        <p:grpSpPr>
+          <a:xfrm>
+            <a:off x="6946800" y="4293987"/>
+            <a:ext cx="356874" cy="448545"/>
+            <a:chOff x="1147591" y="5678571"/>
+            <a:chExt cx="104673" cy="158824"/>
+          </a:xfrm>
+        </p:grpSpPr>
+        <p:sp>
+          <p:nvSpPr>
+            <p:cNvPr id="88" name="Freeform 11">
+              <a:extLst>
+                <a:ext uri="{FF2B5EF4-FFF2-40B4-BE49-F238E27FC236}">
+                  <a16:creationId xmlns:a16="http://schemas.microsoft.com/office/drawing/2014/main" id="{5163826D-CE8C-4005-B72C-94B517526C70}"/>
+                </a:ext>
+              </a:extLst>
+            </p:cNvPr>
+            <p:cNvSpPr/>
+            <p:nvPr/>
+          </p:nvSpPr>
+          <p:spPr>
+            <a:xfrm rot="9447554" flipH="1">
+              <a:off x="1203269" y="5678571"/>
+              <a:ext cx="48995" cy="94527"/>
+            </a:xfrm>
+            <a:custGeom>
+              <a:avLst/>
+              <a:gdLst>
+                <a:gd name="connsiteX0" fmla="*/ 0 w 226400"/>
+                <a:gd name="connsiteY0" fmla="*/ 32920 h 171466"/>
+                <a:gd name="connsiteX1" fmla="*/ 157018 w 226400"/>
+                <a:gd name="connsiteY1" fmla="*/ 5211 h 171466"/>
+                <a:gd name="connsiteX2" fmla="*/ 221673 w 226400"/>
+                <a:gd name="connsiteY2" fmla="*/ 125284 h 171466"/>
+                <a:gd name="connsiteX3" fmla="*/ 36945 w 226400"/>
+                <a:gd name="connsiteY3" fmla="*/ 171466 h 171466"/>
+              </a:gdLst>
+              <a:ahLst/>
+              <a:cxnLst>
+                <a:cxn ang="0">
+                  <a:pos x="connsiteX0" y="connsiteY0"/>
+                </a:cxn>
+                <a:cxn ang="0">
+                  <a:pos x="connsiteX1" y="connsiteY1"/>
+                </a:cxn>
+                <a:cxn ang="0">
+                  <a:pos x="connsiteX2" y="connsiteY2"/>
+                </a:cxn>
+                <a:cxn ang="0">
+                  <a:pos x="connsiteX3" y="connsiteY3"/>
+                </a:cxn>
+              </a:cxnLst>
+              <a:rect l="l" t="t" r="r" b="b"/>
+              <a:pathLst>
+                <a:path w="226400" h="171466">
+                  <a:moveTo>
+                    <a:pt x="0" y="32920"/>
+                  </a:moveTo>
+                  <a:cubicBezTo>
+                    <a:pt x="60036" y="11368"/>
+                    <a:pt x="120073" y="-10183"/>
+                    <a:pt x="157018" y="5211"/>
+                  </a:cubicBezTo>
+                  <a:cubicBezTo>
+                    <a:pt x="193963" y="20605"/>
+                    <a:pt x="241685" y="97575"/>
+                    <a:pt x="221673" y="125284"/>
+                  </a:cubicBezTo>
+                  <a:cubicBezTo>
+                    <a:pt x="201661" y="152993"/>
+                    <a:pt x="119303" y="162229"/>
+                    <a:pt x="36945" y="171466"/>
+                  </a:cubicBezTo>
+                </a:path>
+              </a:pathLst>
+            </a:custGeom>
+            <a:ln w="19050">
+              <a:solidFill>
+                <a:srgbClr val="00B050"/>
+              </a:solidFill>
+              <a:headEnd type="arrow" w="med" len="med"/>
+              <a:tailEnd type="none" w="med" len="med"/>
+            </a:ln>
+          </p:spPr>
+          <p:style>
+            <a:lnRef idx="1">
+              <a:schemeClr val="accent1"/>
+            </a:lnRef>
+            <a:fillRef idx="0">
+              <a:schemeClr val="accent1"/>
+            </a:fillRef>
+            <a:effectRef idx="0">
+              <a:schemeClr val="accent1"/>
+            </a:effectRef>
+            <a:fontRef idx="minor">
+              <a:schemeClr val="tx1"/>
+            </a:fontRef>
+          </p:style>
+          <p:txBody>
+            <a:bodyPr rtlCol="0" anchor="ctr"/>
+            <a:lstStyle/>
+            <a:p>
+              <a:pPr algn="ctr"/>
+              <a:endParaRPr lang="en-SG"/>
+            </a:p>
+          </p:txBody>
+        </p:sp>
+        <p:sp>
+          <p:nvSpPr>
+            <p:cNvPr id="89" name="Rectangle 88">
+              <a:extLst>
+                <a:ext uri="{FF2B5EF4-FFF2-40B4-BE49-F238E27FC236}">
+                  <a16:creationId xmlns:a16="http://schemas.microsoft.com/office/drawing/2014/main" id="{2637FC74-B287-421D-868A-CB91DDA71974}"/>
+                </a:ext>
+              </a:extLst>
+            </p:cNvPr>
+            <p:cNvSpPr/>
+            <p:nvPr/>
+          </p:nvSpPr>
+          <p:spPr>
+            <a:xfrm>
+              <a:off x="1147591" y="5691229"/>
+              <a:ext cx="66045" cy="146166"/>
+            </a:xfrm>
+            <a:prstGeom prst="rect">
+              <a:avLst/>
+            </a:prstGeom>
+            <a:solidFill>
+              <a:srgbClr val="00B050"/>
+            </a:solidFill>
+            <a:ln>
+              <a:solidFill>
+                <a:schemeClr val="bg1"/>
+              </a:solidFill>
+            </a:ln>
+            <a:effectLst/>
+          </p:spPr>
+          <p:style>
+            <a:lnRef idx="1">
+              <a:schemeClr val="accent3"/>
+            </a:lnRef>
+            <a:fillRef idx="2">
+              <a:schemeClr val="accent3"/>
+            </a:fillRef>
+            <a:effectRef idx="1">
+              <a:schemeClr val="accent3"/>
+            </a:effectRef>
+            <a:fontRef idx="minor">
+              <a:schemeClr val="dk1"/>
+            </a:fontRef>
+          </p:style>
+          <p:txBody>
+            <a:bodyPr rtlCol="0" anchor="ctr"/>
+            <a:lstStyle/>
+            <a:p>
+              <a:pPr algn="ctr"/>
+              <a:endParaRPr lang="en-SG" sz="1400">
+                <a:solidFill>
+                  <a:schemeClr val="dk1"/>
+                </a:solidFill>
+              </a:endParaRPr>
+            </a:p>
+          </p:txBody>
+        </p:sp>
+      </p:grpSp>
+      <p:sp>
+        <p:nvSpPr>
+          <p:cNvPr id="91" name="TextBox 90">
+            <a:extLst>
+              <a:ext uri="{FF2B5EF4-FFF2-40B4-BE49-F238E27FC236}">
+                <a16:creationId xmlns:a16="http://schemas.microsoft.com/office/drawing/2014/main" id="{BC469986-DF47-44FD-9599-A88358AD1182}"/>
+              </a:ext>
+            </a:extLst>
+          </p:cNvPr>
+          <p:cNvSpPr txBox="1"/>
+          <p:nvPr/>
+        </p:nvSpPr>
+        <p:spPr>
+          <a:xfrm>
+            <a:off x="7366274" y="4329752"/>
+            <a:ext cx="1178699" cy="215444"/>
+          </a:xfrm>
+          <a:prstGeom prst="rect">
+            <a:avLst/>
+          </a:prstGeom>
+          <a:noFill/>
+        </p:spPr>
+        <p:txBody>
+          <a:bodyPr wrap="square" lIns="0" tIns="0" rIns="0" bIns="0" rtlCol="0">
+            <a:spAutoFit/>
+          </a:bodyPr>
+          <a:lstStyle/>
+          <a:p>
+            <a:r>
+              <a:rPr lang="en-US" sz="1400" dirty="0" err="1">
+                <a:solidFill>
+                  <a:srgbClr val="00B050"/>
+                </a:solidFill>
+              </a:rPr>
+              <a:t>loadMapPage</a:t>
+            </a:r>
+            <a:r>
+              <a:rPr lang="en-US" sz="1400" dirty="0">
+                <a:solidFill>
+                  <a:srgbClr val="00B050"/>
+                </a:solidFill>
+              </a:rPr>
+              <a:t>()</a:t>
+            </a:r>
+          </a:p>
+        </p:txBody>
+      </p:sp>
+      <p:sp>
+        <p:nvSpPr>
+          <p:cNvPr id="27" name="Rectangle 62">
+            <a:extLst>
+              <a:ext uri="{FF2B5EF4-FFF2-40B4-BE49-F238E27FC236}">
+                <a16:creationId xmlns:a16="http://schemas.microsoft.com/office/drawing/2014/main" id="{149C4087-00C7-4459-8989-C26D35C0270A}"/>
+              </a:ext>
+            </a:extLst>
+          </p:cNvPr>
+          <p:cNvSpPr/>
+          <p:nvPr/>
+        </p:nvSpPr>
+        <p:spPr>
+          <a:xfrm>
+            <a:off x="888814" y="2101777"/>
+            <a:ext cx="1424845" cy="503011"/>
+          </a:xfrm>
+          <a:prstGeom prst="rect">
+            <a:avLst/>
+          </a:prstGeom>
+          <a:solidFill>
+            <a:srgbClr val="00B050"/>
+          </a:solidFill>
+          <a:ln w="19050">
+            <a:solidFill>
+              <a:srgbClr val="00B050"/>
+            </a:solidFill>
+          </a:ln>
+          <a:effectLst/>
+        </p:spPr>
+        <p:style>
+          <a:lnRef idx="1">
+            <a:schemeClr val="accent2"/>
+          </a:lnRef>
+          <a:fillRef idx="2">
+            <a:schemeClr val="accent2"/>
+          </a:fillRef>
+          <a:effectRef idx="1">
+            <a:schemeClr val="accent2"/>
+          </a:effectRef>
+          <a:fontRef idx="minor">
+            <a:schemeClr val="dk1"/>
+          </a:fontRef>
+        </p:style>
+        <p:txBody>
+          <a:bodyPr rtlCol="0" anchor="ctr"/>
+          <a:lstStyle/>
+          <a:p>
+            <a:pPr algn="ctr"/>
+            <a:r>
+              <a:rPr lang="en-US" sz="1600" dirty="0">
+                <a:solidFill>
+                  <a:schemeClr val="bg1"/>
+                </a:solidFill>
+              </a:rPr>
+              <a:t>:</a:t>
+            </a:r>
+            <a:r>
+              <a:rPr lang="en-US" sz="1600" dirty="0" err="1">
+                <a:solidFill>
+                  <a:schemeClr val="bg1"/>
+                </a:solidFill>
+              </a:rPr>
+              <a:t>PersonCard</a:t>
+            </a:r>
+            <a:endParaRPr lang="en-US" sz="1600" dirty="0">
+              <a:solidFill>
+                <a:schemeClr val="bg1"/>
+              </a:solidFill>
+            </a:endParaRPr>
+          </a:p>
+          <a:p>
+            <a:pPr algn="ctr"/>
+            <a:r>
+              <a:rPr lang="en-US" sz="1600" dirty="0">
+                <a:solidFill>
+                  <a:schemeClr val="bg1"/>
+                </a:solidFill>
+              </a:rPr>
+              <a:t>Panel</a:t>
+            </a:r>
+            <a:endParaRPr lang="en-SG" sz="1600" dirty="0">
+              <a:solidFill>
+                <a:schemeClr val="bg1"/>
+              </a:solidFill>
+            </a:endParaRPr>
+          </a:p>
+        </p:txBody>
+      </p:sp>
+      <p:cxnSp>
+        <p:nvCxnSpPr>
+          <p:cNvPr id="28" name="Straight Connector 27">
+            <a:extLst>
+              <a:ext uri="{FF2B5EF4-FFF2-40B4-BE49-F238E27FC236}">
+                <a16:creationId xmlns:a16="http://schemas.microsoft.com/office/drawing/2014/main" id="{5DE2B624-9921-416A-935D-D9AA993FD4F3}"/>
+              </a:ext>
+            </a:extLst>
+          </p:cNvPr>
+          <p:cNvCxnSpPr>
+            <a:cxnSpLocks/>
+            <a:stCxn id="27" idx="2"/>
+          </p:cNvCxnSpPr>
+          <p:nvPr/>
+        </p:nvCxnSpPr>
+        <p:spPr>
+          <a:xfrm flipH="1">
+            <a:off x="1601235" y="2604788"/>
+            <a:ext cx="2" cy="2934486"/>
+          </a:xfrm>
+          <a:prstGeom prst="line">
+            <a:avLst/>
+          </a:prstGeom>
+          <a:ln w="19050">
+            <a:solidFill>
+              <a:srgbClr val="00B050"/>
+            </a:solidFill>
+            <a:prstDash val="sysDash"/>
+          </a:ln>
+          <a:effectLst/>
+        </p:spPr>
+        <p:style>
+          <a:lnRef idx="1">
+            <a:schemeClr val="accent1"/>
+          </a:lnRef>
+          <a:fillRef idx="2">
+            <a:schemeClr val="accent1"/>
+          </a:fillRef>
+          <a:effectRef idx="1">
+            <a:schemeClr val="accent1"/>
+          </a:effectRef>
+          <a:fontRef idx="minor">
+            <a:schemeClr val="dk1"/>
+          </a:fontRef>
+        </p:style>
+      </p:cxnSp>
+      <p:sp>
+        <p:nvSpPr>
+          <p:cNvPr id="29" name="Rectangle 28">
+            <a:extLst>
+              <a:ext uri="{FF2B5EF4-FFF2-40B4-BE49-F238E27FC236}">
+                <a16:creationId xmlns:a16="http://schemas.microsoft.com/office/drawing/2014/main" id="{2628170C-977D-430E-A673-32E1C29BDD4C}"/>
+              </a:ext>
+            </a:extLst>
+          </p:cNvPr>
+          <p:cNvSpPr/>
+          <p:nvPr/>
+        </p:nvSpPr>
+        <p:spPr>
+          <a:xfrm>
+            <a:off x="1514013" y="3087783"/>
+            <a:ext cx="183860" cy="2218743"/>
+          </a:xfrm>
+          <a:prstGeom prst="rect">
+            <a:avLst/>
+          </a:prstGeom>
+          <a:solidFill>
+            <a:srgbClr val="00B050"/>
+          </a:solidFill>
+          <a:ln>
+            <a:solidFill>
+              <a:srgbClr val="00B050"/>
+            </a:solidFill>
+          </a:ln>
+          <a:effectLst/>
+        </p:spPr>
+        <p:style>
+          <a:lnRef idx="1">
+            <a:schemeClr val="accent3"/>
+          </a:lnRef>
+          <a:fillRef idx="2">
+            <a:schemeClr val="accent3"/>
+          </a:fillRef>
+          <a:effectRef idx="1">
+            <a:schemeClr val="accent3"/>
+          </a:effectRef>
+          <a:fontRef idx="minor">
+            <a:schemeClr val="dk1"/>
+          </a:fontRef>
+        </p:style>
+        <p:txBody>
+          <a:bodyPr rtlCol="0" anchor="ctr"/>
+          <a:lstStyle/>
+          <a:p>
+            <a:pPr algn="ctr"/>
+            <a:endParaRPr lang="en-SG" sz="1400">
+              <a:solidFill>
+                <a:schemeClr val="dk1"/>
+              </a:solidFill>
+            </a:endParaRPr>
+          </a:p>
+        </p:txBody>
+      </p:sp>
+      <p:cxnSp>
+        <p:nvCxnSpPr>
+          <p:cNvPr id="30" name="Straight Arrow Connector 29">
+            <a:extLst>
+              <a:ext uri="{FF2B5EF4-FFF2-40B4-BE49-F238E27FC236}">
+                <a16:creationId xmlns:a16="http://schemas.microsoft.com/office/drawing/2014/main" id="{97C74FEC-C24C-486F-BF8D-D317357A8DCC}"/>
+              </a:ext>
+            </a:extLst>
+          </p:cNvPr>
+          <p:cNvCxnSpPr>
+            <a:cxnSpLocks/>
+          </p:cNvCxnSpPr>
+          <p:nvPr/>
+        </p:nvCxnSpPr>
+        <p:spPr>
+          <a:xfrm>
+            <a:off x="1611808" y="4005571"/>
+            <a:ext cx="2411928" cy="9993"/>
+          </a:xfrm>
+          <a:prstGeom prst="straightConnector1">
+            <a:avLst/>
+          </a:prstGeom>
+          <a:ln w="19050">
+            <a:solidFill>
+              <a:srgbClr val="00B050"/>
+            </a:solidFill>
+            <a:headEnd type="none" w="med" len="med"/>
+            <a:tailEnd type="arrow" w="med" len="med"/>
+          </a:ln>
+        </p:spPr>
+        <p:style>
+          <a:lnRef idx="1">
+            <a:schemeClr val="accent1"/>
+          </a:lnRef>
+          <a:fillRef idx="0">
+            <a:schemeClr val="accent1"/>
+          </a:fillRef>
+          <a:effectRef idx="0">
+            <a:schemeClr val="accent1"/>
+          </a:effectRef>
+          <a:fontRef idx="minor">
+            <a:schemeClr val="tx1"/>
+          </a:fontRef>
+        </p:style>
+      </p:cxnSp>
+      <p:grpSp>
+        <p:nvGrpSpPr>
+          <p:cNvPr id="21" name="Group 20">
+            <a:extLst>
+              <a:ext uri="{FF2B5EF4-FFF2-40B4-BE49-F238E27FC236}">
+                <a16:creationId xmlns:a16="http://schemas.microsoft.com/office/drawing/2014/main" id="{934A2A5F-663B-4D5D-A80E-74E2C1C4ACF2}"/>
+              </a:ext>
+            </a:extLst>
+          </p:cNvPr>
+          <p:cNvGrpSpPr/>
+          <p:nvPr/>
+        </p:nvGrpSpPr>
+        <p:grpSpPr>
+          <a:xfrm>
+            <a:off x="1598600" y="3153310"/>
+            <a:ext cx="356874" cy="448545"/>
+            <a:chOff x="1147591" y="5678571"/>
+            <a:chExt cx="104673" cy="158824"/>
+          </a:xfrm>
+        </p:grpSpPr>
+        <p:sp>
+          <p:nvSpPr>
+            <p:cNvPr id="22" name="Freeform 11">
+              <a:extLst>
+                <a:ext uri="{FF2B5EF4-FFF2-40B4-BE49-F238E27FC236}">
+                  <a16:creationId xmlns:a16="http://schemas.microsoft.com/office/drawing/2014/main" id="{AF7F0853-AED8-44BB-807D-B758F723BB52}"/>
+                </a:ext>
+              </a:extLst>
+            </p:cNvPr>
+            <p:cNvSpPr/>
+            <p:nvPr/>
+          </p:nvSpPr>
+          <p:spPr>
+            <a:xfrm rot="9447554" flipH="1">
+              <a:off x="1203269" y="5678571"/>
+              <a:ext cx="48995" cy="94527"/>
+            </a:xfrm>
+            <a:custGeom>
+              <a:avLst/>
+              <a:gdLst>
+                <a:gd name="connsiteX0" fmla="*/ 0 w 226400"/>
+                <a:gd name="connsiteY0" fmla="*/ 32920 h 171466"/>
+                <a:gd name="connsiteX1" fmla="*/ 157018 w 226400"/>
+                <a:gd name="connsiteY1" fmla="*/ 5211 h 171466"/>
+                <a:gd name="connsiteX2" fmla="*/ 221673 w 226400"/>
+                <a:gd name="connsiteY2" fmla="*/ 125284 h 171466"/>
+                <a:gd name="connsiteX3" fmla="*/ 36945 w 226400"/>
+                <a:gd name="connsiteY3" fmla="*/ 171466 h 171466"/>
+              </a:gdLst>
+              <a:ahLst/>
+              <a:cxnLst>
+                <a:cxn ang="0">
+                  <a:pos x="connsiteX0" y="connsiteY0"/>
+                </a:cxn>
+                <a:cxn ang="0">
+                  <a:pos x="connsiteX1" y="connsiteY1"/>
+                </a:cxn>
+                <a:cxn ang="0">
+                  <a:pos x="connsiteX2" y="connsiteY2"/>
+                </a:cxn>
+                <a:cxn ang="0">
+                  <a:pos x="connsiteX3" y="connsiteY3"/>
+                </a:cxn>
+              </a:cxnLst>
+              <a:rect l="l" t="t" r="r" b="b"/>
+              <a:pathLst>
+                <a:path w="226400" h="171466">
+                  <a:moveTo>
+                    <a:pt x="0" y="32920"/>
+                  </a:moveTo>
+                  <a:cubicBezTo>
+                    <a:pt x="60036" y="11368"/>
+                    <a:pt x="120073" y="-10183"/>
+                    <a:pt x="157018" y="5211"/>
+                  </a:cubicBezTo>
+                  <a:cubicBezTo>
+                    <a:pt x="193963" y="20605"/>
+                    <a:pt x="241685" y="97575"/>
+                    <a:pt x="221673" y="125284"/>
+                  </a:cubicBezTo>
+                  <a:cubicBezTo>
+                    <a:pt x="201661" y="152993"/>
+                    <a:pt x="119303" y="162229"/>
+                    <a:pt x="36945" y="171466"/>
+                  </a:cubicBezTo>
+                </a:path>
+              </a:pathLst>
+            </a:custGeom>
+            <a:ln w="19050">
+              <a:solidFill>
+                <a:srgbClr val="00B050"/>
+              </a:solidFill>
+              <a:headEnd type="arrow" w="med" len="med"/>
+              <a:tailEnd type="none" w="med" len="med"/>
+            </a:ln>
+          </p:spPr>
+          <p:style>
+            <a:lnRef idx="1">
+              <a:schemeClr val="accent1"/>
+            </a:lnRef>
+            <a:fillRef idx="0">
+              <a:schemeClr val="accent1"/>
+            </a:fillRef>
+            <a:effectRef idx="0">
+              <a:schemeClr val="accent1"/>
+            </a:effectRef>
+            <a:fontRef idx="minor">
+              <a:schemeClr val="tx1"/>
+            </a:fontRef>
+          </p:style>
+          <p:txBody>
+            <a:bodyPr rtlCol="0" anchor="ctr"/>
+            <a:lstStyle/>
+            <a:p>
+              <a:pPr algn="ctr"/>
+              <a:endParaRPr lang="en-SG"/>
+            </a:p>
+          </p:txBody>
+        </p:sp>
+        <p:sp>
+          <p:nvSpPr>
+            <p:cNvPr id="23" name="Rectangle 22">
+              <a:extLst>
+                <a:ext uri="{FF2B5EF4-FFF2-40B4-BE49-F238E27FC236}">
+                  <a16:creationId xmlns:a16="http://schemas.microsoft.com/office/drawing/2014/main" id="{7D97A408-B742-4D71-9C70-36D34F1BA8AE}"/>
+                </a:ext>
+              </a:extLst>
+            </p:cNvPr>
+            <p:cNvSpPr/>
+            <p:nvPr/>
+          </p:nvSpPr>
+          <p:spPr>
+            <a:xfrm>
+              <a:off x="1147591" y="5691229"/>
+              <a:ext cx="66045" cy="146166"/>
+            </a:xfrm>
+            <a:prstGeom prst="rect">
+              <a:avLst/>
+            </a:prstGeom>
+            <a:solidFill>
+              <a:srgbClr val="00B050"/>
+            </a:solidFill>
+            <a:ln>
+              <a:solidFill>
+                <a:schemeClr val="bg1"/>
+              </a:solidFill>
+            </a:ln>
+            <a:effectLst/>
+          </p:spPr>
+          <p:style>
+            <a:lnRef idx="1">
+              <a:schemeClr val="accent3"/>
+            </a:lnRef>
+            <a:fillRef idx="2">
+              <a:schemeClr val="accent3"/>
+            </a:fillRef>
+            <a:effectRef idx="1">
+              <a:schemeClr val="accent3"/>
+            </a:effectRef>
+            <a:fontRef idx="minor">
+              <a:schemeClr val="dk1"/>
+            </a:fontRef>
+          </p:style>
+          <p:txBody>
+            <a:bodyPr rtlCol="0" anchor="ctr"/>
+            <a:lstStyle/>
+            <a:p>
+              <a:pPr algn="ctr"/>
+              <a:endParaRPr lang="en-SG" sz="1400">
+                <a:solidFill>
+                  <a:schemeClr val="dk1"/>
+                </a:solidFill>
+              </a:endParaRPr>
+            </a:p>
+          </p:txBody>
+        </p:sp>
+      </p:grpSp>
+      <p:sp>
+        <p:nvSpPr>
+          <p:cNvPr id="24" name="TextBox 23">
+            <a:extLst>
+              <a:ext uri="{FF2B5EF4-FFF2-40B4-BE49-F238E27FC236}">
+                <a16:creationId xmlns:a16="http://schemas.microsoft.com/office/drawing/2014/main" id="{E746041C-38A1-45DA-A5F8-630C8289FBE0}"/>
+              </a:ext>
+            </a:extLst>
+          </p:cNvPr>
+          <p:cNvSpPr txBox="1"/>
+          <p:nvPr/>
+        </p:nvSpPr>
+        <p:spPr>
+          <a:xfrm>
+            <a:off x="2018074" y="3189075"/>
+            <a:ext cx="1451460" cy="215444"/>
+          </a:xfrm>
+          <a:prstGeom prst="rect">
+            <a:avLst/>
+          </a:prstGeom>
+          <a:noFill/>
+        </p:spPr>
+        <p:txBody>
+          <a:bodyPr wrap="square" lIns="0" tIns="0" rIns="0" bIns="0" rtlCol="0">
+            <a:spAutoFit/>
+          </a:bodyPr>
+          <a:lstStyle/>
+          <a:p>
+            <a:r>
+              <a:rPr lang="en-US" sz="1400" dirty="0" err="1">
+                <a:solidFill>
+                  <a:srgbClr val="00B050"/>
+                </a:solidFill>
+              </a:rPr>
+              <a:t>handleGoogleMap</a:t>
+            </a:r>
+            <a:r>
+              <a:rPr lang="en-US" sz="1400" dirty="0">
+                <a:solidFill>
+                  <a:srgbClr val="00B050"/>
+                </a:solidFill>
+              </a:rPr>
+              <a:t>()</a:t>
+            </a:r>
           </a:p>
         </p:txBody>
       </p:sp>
     </p:spTree>
     <p:extLst>
       <p:ext uri="{BB962C8B-B14F-4D97-AF65-F5344CB8AC3E}">
-        <p14:creationId xmlns:p14="http://schemas.microsoft.com/office/powerpoint/2010/main" val="2662356794"/>
+        <p14:creationId xmlns:p14="http://schemas.microsoft.com/office/powerpoint/2010/main" val="1953744500"/>
       </p:ext>
     </p:extLst>
   </p:cSld>

</xml_diff>

<commit_message>
Corrected UML Sequence diagram common mistakes
</commit_message>
<xml_diff>
--- a/docs/diagrams/GmapSequenceDiagram.pptx
+++ b/docs/diagrams/GmapSequenceDiagram.pptx
@@ -214,7 +214,7 @@
           <a:p>
             <a:fld id="{F5CC4B3F-88C1-4FFA-B1B6-F41C21DC6924}" type="datetimeFigureOut">
               <a:rPr lang="en-US" smtClean="0"/>
-              <a:t>11-Nov-17</a:t>
+              <a:t>13-Nov-17</a:t>
             </a:fld>
             <a:endParaRPr lang="en-US"/>
           </a:p>
@@ -660,7 +660,7 @@
           <a:p>
             <a:fld id="{78C97017-6FC3-485B-9764-EAC9E56C1D49}" type="datetimeFigureOut">
               <a:rPr lang="en-US" smtClean="0"/>
-              <a:t>11-Nov-17</a:t>
+              <a:t>13-Nov-17</a:t>
             </a:fld>
             <a:endParaRPr lang="en-US"/>
           </a:p>
@@ -828,7 +828,7 @@
           <a:p>
             <a:fld id="{78C97017-6FC3-485B-9764-EAC9E56C1D49}" type="datetimeFigureOut">
               <a:rPr lang="en-US" smtClean="0"/>
-              <a:t>11-Nov-17</a:t>
+              <a:t>13-Nov-17</a:t>
             </a:fld>
             <a:endParaRPr lang="en-US"/>
           </a:p>
@@ -1006,7 +1006,7 @@
           <a:p>
             <a:fld id="{78C97017-6FC3-485B-9764-EAC9E56C1D49}" type="datetimeFigureOut">
               <a:rPr lang="en-US" smtClean="0"/>
-              <a:t>11-Nov-17</a:t>
+              <a:t>13-Nov-17</a:t>
             </a:fld>
             <a:endParaRPr lang="en-US"/>
           </a:p>
@@ -1174,7 +1174,7 @@
           <a:p>
             <a:fld id="{78C97017-6FC3-485B-9764-EAC9E56C1D49}" type="datetimeFigureOut">
               <a:rPr lang="en-US" smtClean="0"/>
-              <a:t>11-Nov-17</a:t>
+              <a:t>13-Nov-17</a:t>
             </a:fld>
             <a:endParaRPr lang="en-US"/>
           </a:p>
@@ -1419,7 +1419,7 @@
           <a:p>
             <a:fld id="{78C97017-6FC3-485B-9764-EAC9E56C1D49}" type="datetimeFigureOut">
               <a:rPr lang="en-US" smtClean="0"/>
-              <a:t>11-Nov-17</a:t>
+              <a:t>13-Nov-17</a:t>
             </a:fld>
             <a:endParaRPr lang="en-US"/>
           </a:p>
@@ -1704,7 +1704,7 @@
           <a:p>
             <a:fld id="{78C97017-6FC3-485B-9764-EAC9E56C1D49}" type="datetimeFigureOut">
               <a:rPr lang="en-US" smtClean="0"/>
-              <a:t>11-Nov-17</a:t>
+              <a:t>13-Nov-17</a:t>
             </a:fld>
             <a:endParaRPr lang="en-US"/>
           </a:p>
@@ -2123,7 +2123,7 @@
           <a:p>
             <a:fld id="{78C97017-6FC3-485B-9764-EAC9E56C1D49}" type="datetimeFigureOut">
               <a:rPr lang="en-US" smtClean="0"/>
-              <a:t>11-Nov-17</a:t>
+              <a:t>13-Nov-17</a:t>
             </a:fld>
             <a:endParaRPr lang="en-US"/>
           </a:p>
@@ -2240,7 +2240,7 @@
           <a:p>
             <a:fld id="{78C97017-6FC3-485B-9764-EAC9E56C1D49}" type="datetimeFigureOut">
               <a:rPr lang="en-US" smtClean="0"/>
-              <a:t>11-Nov-17</a:t>
+              <a:t>13-Nov-17</a:t>
             </a:fld>
             <a:endParaRPr lang="en-US"/>
           </a:p>
@@ -2335,7 +2335,7 @@
           <a:p>
             <a:fld id="{78C97017-6FC3-485B-9764-EAC9E56C1D49}" type="datetimeFigureOut">
               <a:rPr lang="en-US" smtClean="0"/>
-              <a:t>11-Nov-17</a:t>
+              <a:t>13-Nov-17</a:t>
             </a:fld>
             <a:endParaRPr lang="en-US"/>
           </a:p>
@@ -2610,7 +2610,7 @@
           <a:p>
             <a:fld id="{78C97017-6FC3-485B-9764-EAC9E56C1D49}" type="datetimeFigureOut">
               <a:rPr lang="en-US" smtClean="0"/>
-              <a:t>11-Nov-17</a:t>
+              <a:t>13-Nov-17</a:t>
             </a:fld>
             <a:endParaRPr lang="en-US"/>
           </a:p>
@@ -2862,7 +2862,7 @@
           <a:p>
             <a:fld id="{78C97017-6FC3-485B-9764-EAC9E56C1D49}" type="datetimeFigureOut">
               <a:rPr lang="en-US" smtClean="0"/>
-              <a:t>11-Nov-17</a:t>
+              <a:t>13-Nov-17</a:t>
             </a:fld>
             <a:endParaRPr lang="en-US"/>
           </a:p>
@@ -3073,7 +3073,7 @@
           <a:p>
             <a:fld id="{78C97017-6FC3-485B-9764-EAC9E56C1D49}" type="datetimeFigureOut">
               <a:rPr lang="en-US" smtClean="0"/>
-              <a:t>11-Nov-17</a:t>
+              <a:t>13-Nov-17</a:t>
             </a:fld>
             <a:endParaRPr lang="en-US"/>
           </a:p>
@@ -3562,8 +3562,8 @@
         </p:nvSpPr>
         <p:spPr>
           <a:xfrm>
-            <a:off x="2979975" y="2512643"/>
-            <a:ext cx="152400" cy="2932689"/>
+            <a:off x="2979974" y="2618250"/>
+            <a:ext cx="158125" cy="2827082"/>
           </a:xfrm>
           <a:prstGeom prst="rect">
             <a:avLst/>
@@ -3856,7 +3856,7 @@
         </p:nvCxnSpPr>
         <p:spPr>
           <a:xfrm>
-            <a:off x="1860124" y="2516331"/>
+            <a:off x="1939185" y="2618250"/>
             <a:ext cx="1119851" cy="0"/>
           </a:xfrm>
           <a:prstGeom prst="straightConnector1">
@@ -3892,7 +3892,7 @@
         </p:nvSpPr>
         <p:spPr>
           <a:xfrm>
-            <a:off x="1288626" y="2244932"/>
+            <a:off x="1454831" y="2360482"/>
             <a:ext cx="1615344" cy="215444"/>
           </a:xfrm>
           <a:prstGeom prst="rect">
@@ -3910,7 +3910,7 @@
             <a:r>
               <a:rPr lang="en-US" sz="1400" dirty="0">
                 <a:solidFill>
-                  <a:srgbClr val="0070C0"/>
+                  <a:srgbClr val="00B050"/>
                 </a:solidFill>
               </a:rPr>
               <a:t>execute(“</a:t>
@@ -3918,7 +3918,7 @@
             <a:r>
               <a:rPr lang="en-US" sz="1400" dirty="0" err="1">
                 <a:solidFill>
-                  <a:srgbClr val="0070C0"/>
+                  <a:srgbClr val="00B050"/>
                 </a:solidFill>
               </a:rPr>
               <a:t>gmap</a:t>
@@ -3926,7 +3926,7 @@
             <a:r>
               <a:rPr lang="en-US" sz="1400" dirty="0">
                 <a:solidFill>
-                  <a:srgbClr val="0070C0"/>
+                  <a:srgbClr val="00B050"/>
                 </a:solidFill>
               </a:rPr>
               <a:t> 1”)</a:t>
@@ -4754,7 +4754,7 @@
         </p:nvSpPr>
         <p:spPr>
           <a:xfrm>
-            <a:off x="-160126" y="2795467"/>
+            <a:off x="-112440" y="2758199"/>
             <a:ext cx="1424846" cy="215444"/>
           </a:xfrm>
           <a:prstGeom prst="rect">
@@ -4874,7 +4874,7 @@
         </p:nvCxnSpPr>
         <p:spPr>
           <a:xfrm>
-            <a:off x="387591" y="3068630"/>
+            <a:off x="454812" y="2991605"/>
             <a:ext cx="1089847" cy="9302"/>
           </a:xfrm>
           <a:prstGeom prst="straightConnector1">
@@ -5035,7 +5035,7 @@
         </p:nvSpPr>
         <p:spPr>
           <a:xfrm>
-            <a:off x="6836946" y="3498940"/>
+            <a:off x="6848668" y="4100320"/>
             <a:ext cx="198555" cy="794359"/>
           </a:xfrm>
           <a:prstGeom prst="rect">
@@ -5216,8 +5216,8 @@
         </p:nvSpPr>
         <p:spPr>
           <a:xfrm>
-            <a:off x="4013162" y="3372785"/>
-            <a:ext cx="142006" cy="1036757"/>
+            <a:off x="4019840" y="3372786"/>
+            <a:ext cx="135327" cy="737746"/>
           </a:xfrm>
           <a:prstGeom prst="rect">
             <a:avLst/>
@@ -5279,7 +5279,7 @@
         </p:nvCxnSpPr>
         <p:spPr>
           <a:xfrm>
-            <a:off x="4155168" y="3505200"/>
+            <a:off x="4145741" y="4110532"/>
             <a:ext cx="2681778" cy="0"/>
           </a:xfrm>
           <a:prstGeom prst="straightConnector1">
@@ -5328,7 +5328,7 @@
         <p:spPr>
           <a:xfrm>
             <a:off x="1572859" y="3359238"/>
-            <a:ext cx="2511306" cy="13547"/>
+            <a:ext cx="2514645" cy="13548"/>
           </a:xfrm>
           <a:prstGeom prst="straightConnector1">
             <a:avLst/>
@@ -5640,7 +5640,7 @@
         </p:nvSpPr>
         <p:spPr>
           <a:xfrm>
-            <a:off x="4698964" y="3223549"/>
+            <a:off x="4715190" y="3851286"/>
             <a:ext cx="2110037" cy="215444"/>
           </a:xfrm>
           <a:prstGeom prst="rect">
@@ -5687,7 +5687,7 @@
         </p:nvGrpSpPr>
         <p:grpSpPr>
           <a:xfrm>
-            <a:off x="6936226" y="3661987"/>
+            <a:off x="6947948" y="4263367"/>
             <a:ext cx="356874" cy="448545"/>
             <a:chOff x="1147591" y="5678571"/>
             <a:chExt cx="104673" cy="158824"/>
@@ -5864,7 +5864,7 @@
         </p:nvSpPr>
         <p:spPr>
           <a:xfrm>
-            <a:off x="7355700" y="3697752"/>
+            <a:off x="7367422" y="4299132"/>
             <a:ext cx="1178699" cy="215444"/>
           </a:xfrm>
           <a:prstGeom prst="rect">
@@ -6060,7 +6060,7 @@
         </p:nvSpPr>
         <p:spPr>
           <a:xfrm>
-            <a:off x="6847520" y="4130940"/>
+            <a:off x="6831558" y="4492663"/>
             <a:ext cx="198555" cy="794359"/>
           </a:xfrm>
           <a:prstGeom prst="rect">
@@ -6241,8 +6241,8 @@
         </p:nvSpPr>
         <p:spPr>
           <a:xfrm>
-            <a:off x="4023736" y="4004785"/>
-            <a:ext cx="142006" cy="1036757"/>
+            <a:off x="4003584" y="4075362"/>
+            <a:ext cx="161980" cy="411950"/>
           </a:xfrm>
           <a:prstGeom prst="rect">
             <a:avLst/>
@@ -6299,13 +6299,15 @@
           </p:cNvPr>
           <p:cNvCxnSpPr>
             <a:cxnSpLocks/>
+            <a:stCxn id="58" idx="2"/>
+            <a:endCxn id="55" idx="0"/>
           </p:cNvCxnSpPr>
           <p:nvPr/>
         </p:nvCxnSpPr>
         <p:spPr>
           <a:xfrm>
-            <a:off x="4165742" y="4137200"/>
-            <a:ext cx="2681778" cy="0"/>
+            <a:off x="4084574" y="4487312"/>
+            <a:ext cx="2846262" cy="5351"/>
           </a:xfrm>
           <a:prstGeom prst="straightConnector1">
             <a:avLst/>
@@ -6349,7 +6351,7 @@
         </p:nvSpPr>
         <p:spPr>
           <a:xfrm>
-            <a:off x="2001800" y="3710392"/>
+            <a:off x="2171719" y="3817923"/>
             <a:ext cx="1895179" cy="215444"/>
           </a:xfrm>
           <a:prstGeom prst="rect">
@@ -6404,7 +6406,7 @@
         </p:nvSpPr>
         <p:spPr>
           <a:xfrm>
-            <a:off x="4709538" y="3855549"/>
+            <a:off x="4820801" y="4208838"/>
             <a:ext cx="2110037" cy="215444"/>
           </a:xfrm>
           <a:prstGeom prst="rect">
@@ -6451,7 +6453,7 @@
         </p:nvGrpSpPr>
         <p:grpSpPr>
           <a:xfrm>
-            <a:off x="6946800" y="4293987"/>
+            <a:off x="6930838" y="4655710"/>
             <a:ext cx="356874" cy="448545"/>
             <a:chOff x="1147591" y="5678571"/>
             <a:chExt cx="104673" cy="158824"/>
@@ -6628,7 +6630,7 @@
         </p:nvSpPr>
         <p:spPr>
           <a:xfrm>
-            <a:off x="7366274" y="4329752"/>
+            <a:off x="7350312" y="4691475"/>
             <a:ext cx="1178699" cy="215444"/>
           </a:xfrm>
           <a:prstGeom prst="rect">
@@ -6810,8 +6812,8 @@
         </p:nvSpPr>
         <p:spPr>
           <a:xfrm>
-            <a:off x="1514013" y="3087783"/>
-            <a:ext cx="183860" cy="2218743"/>
+            <a:off x="1514012" y="3087784"/>
+            <a:ext cx="211817" cy="945583"/>
           </a:xfrm>
           <a:prstGeom prst="rect">
             <a:avLst/>
@@ -6869,7 +6871,7 @@
         </p:nvCxnSpPr>
         <p:spPr>
           <a:xfrm>
-            <a:off x="1611808" y="4005571"/>
+            <a:off x="1657964" y="4055800"/>
             <a:ext cx="2411928" cy="9993"/>
           </a:xfrm>
           <a:prstGeom prst="straightConnector1">

</xml_diff>